<commit_message>
Some reformatting in slides
</commit_message>
<xml_diff>
--- a/slides/flink_stream_connectors.pptx
+++ b/slides/flink_stream_connectors.pptx
@@ -134,7 +134,7 @@
   </p:defaultTextStyle>
   <p:extLst>
     <p:ext uri="{EFAFB233-063F-42B5-8137-9DF3F51BA10A}">
-      <p15:sldGuideLst xmlns="" xmlns:p15="http://schemas.microsoft.com/office/powerpoint/2012/main">
+      <p15:sldGuideLst xmlns:p15="http://schemas.microsoft.com/office/powerpoint/2012/main" xmlns="">
         <p15:guide id="1" orient="horz" pos="2160">
           <p15:clr>
             <a:srgbClr val="A4A3A4"/>
@@ -242,7 +242,7 @@
           <a:p>
             <a:fld id="{B3959732-07FC-4A49-B88C-49A8EB1F4FC9}" type="datetimeFigureOut">
               <a:rPr lang="en-US" smtClean="0"/>
-              <a:t>09/09/2016</a:t>
+              <a:t>09/09/16</a:t>
             </a:fld>
             <a:endParaRPr lang="en-US"/>
           </a:p>
@@ -7791,8 +7791,8 @@
         </p:nvSpPr>
         <p:spPr>
           <a:xfrm>
-            <a:off x="1357204" y="1412032"/>
-            <a:ext cx="6429592" cy="611700"/>
+            <a:off x="1357204" y="719535"/>
+            <a:ext cx="6429592" cy="1996694"/>
           </a:xfrm>
           <a:prstGeom prst="rect">
             <a:avLst/>
@@ -7821,20 +7821,65 @@
               </a:defRPr>
             </a:pPr>
             <a:r>
-              <a:rPr lang="en-US" sz="3600" spc="-1">
-                <a:solidFill>
-                  <a:srgbClr val="FFFFFF"/>
-                </a:solidFill>
-                <a:uFill>
-                  <a:solidFill>
-                    <a:srgbClr val="FFFFFF"/>
-                  </a:solidFill>
-                </a:uFill>
-                <a:latin typeface="Calibri"/>
-              </a:rPr>
-              <a:t>DataStream API: Connectors</a:t>
-            </a:r>
-            <a:endParaRPr lang="en-US" sz="3600" spc="-1">
+              <a:rPr lang="en-US" sz="5400" spc="-1" dirty="0">
+                <a:solidFill>
+                  <a:srgbClr val="FFFFFF"/>
+                </a:solidFill>
+                <a:uFill>
+                  <a:solidFill>
+                    <a:srgbClr val="FFFFFF"/>
+                  </a:solidFill>
+                </a:uFill>
+                <a:latin typeface="Calibri"/>
+              </a:rPr>
+              <a:t>DataStream API</a:t>
+            </a:r>
+          </a:p>
+          <a:p>
+            <a:pPr algn="ctr" defTabSz="328570" hangingPunct="0">
+              <a:defRPr sz="6400">
+                <a:latin typeface="Helvetica Neue Medium"/>
+                <a:ea typeface="Helvetica Neue Medium"/>
+                <a:cs typeface="Helvetica Neue Medium"/>
+                <a:sym typeface="Helvetica Neue Medium"/>
+              </a:defRPr>
+            </a:pPr>
+            <a:endParaRPr lang="en-US" sz="3600" spc="-1" dirty="0">
+              <a:solidFill>
+                <a:srgbClr val="FFFFFF"/>
+              </a:solidFill>
+              <a:uFill>
+                <a:solidFill>
+                  <a:srgbClr val="FFFFFF"/>
+                </a:solidFill>
+              </a:uFill>
+              <a:latin typeface="Calibri"/>
+            </a:endParaRPr>
+          </a:p>
+          <a:p>
+            <a:pPr algn="ctr" defTabSz="328570" hangingPunct="0">
+              <a:defRPr sz="6400">
+                <a:latin typeface="Helvetica Neue Medium"/>
+                <a:ea typeface="Helvetica Neue Medium"/>
+                <a:cs typeface="Helvetica Neue Medium"/>
+                <a:sym typeface="Helvetica Neue Medium"/>
+              </a:defRPr>
+            </a:pPr>
+            <a:r>
+              <a:rPr lang="en-US" sz="3600" spc="-1" dirty="0" smtClean="0">
+                <a:solidFill>
+                  <a:srgbClr val="FFFFFF"/>
+                </a:solidFill>
+                <a:uFill>
+                  <a:solidFill>
+                    <a:srgbClr val="FFFFFF"/>
+                  </a:solidFill>
+                </a:uFill>
+                <a:latin typeface="Calibri"/>
+              </a:rPr>
+              <a:t>Connectors</a:t>
+            </a:r>
+            <a:endParaRPr lang="en-US" sz="3600" spc="-1" dirty="0">
               <a:solidFill>
                 <a:srgbClr val="FFFFFF"/>
               </a:solidFill>
@@ -7972,7 +8017,7 @@
         <p:spPr>
           <a:xfrm>
             <a:off x="5147280" y="5475914"/>
-            <a:ext cx="2648031" cy="1015663"/>
+            <a:ext cx="2778024" cy="1015663"/>
           </a:xfrm>
           <a:prstGeom prst="rect">
             <a:avLst/>
@@ -7991,7 +8036,31 @@
                   <a:schemeClr val="bg1"/>
                 </a:solidFill>
               </a:rPr>
-              <a:t>Flink v1.1.2 – 5.09.2016</a:t>
+              <a:t>Flink v1.1.2 </a:t>
+            </a:r>
+            <a:r>
+              <a:rPr lang="nb-NO" sz="2000">
+                <a:solidFill>
+                  <a:schemeClr val="bg1"/>
+                </a:solidFill>
+              </a:rPr>
+              <a:t>– </a:t>
+            </a:r>
+            <a:r>
+              <a:rPr lang="nb-NO" sz="2000" smtClean="0">
+                <a:solidFill>
+                  <a:schemeClr val="bg1"/>
+                </a:solidFill>
+              </a:rPr>
+              <a:t>14.09.2016</a:t>
+            </a:r>
+            <a:r>
+              <a:rPr lang="nb-NO" sz="2000" dirty="0">
+                <a:solidFill>
+                  <a:schemeClr val="bg1"/>
+                </a:solidFill>
+              </a:rPr>
+              <a:t/>
             </a:r>
             <a:br>
               <a:rPr lang="nb-NO" sz="2000" dirty="0">
@@ -8009,7 +8078,7 @@
             </a:endParaRPr>
           </a:p>
           <a:p>
-            <a:endParaRPr lang="en-US" sz="2000"/>
+            <a:endParaRPr lang="en-US" sz="2000" dirty="0"/>
           </a:p>
         </p:txBody>
       </p:sp>
@@ -8376,7 +8445,7 @@
               <a:buChar char=""/>
             </a:pPr>
             <a:r>
-              <a:rPr lang="en-US" sz="2800" b="0" strike="noStrike" spc="-1">
+              <a:rPr lang="en-US" sz="2800" b="0" strike="noStrike" spc="-1" dirty="0">
                 <a:solidFill>
                   <a:srgbClr val="000000"/>
                 </a:solidFill>
@@ -8401,7 +8470,7 @@
               <a:buFont typeface="Wingdings" charset="2"/>
               <a:buChar char=""/>
             </a:pPr>
-            <a:endParaRPr lang="en-US" sz="2800" spc="-1">
+            <a:endParaRPr lang="en-US" sz="2800" spc="-1" dirty="0">
               <a:solidFill>
                 <a:srgbClr val="000000"/>
               </a:solidFill>
@@ -8425,18 +8494,46 @@
               <a:buChar char=""/>
             </a:pPr>
             <a:r>
-              <a:rPr lang="en-US" sz="2800" b="0" strike="noStrike" spc="-1">
-                <a:solidFill>
-                  <a:srgbClr val="000000"/>
-                </a:solidFill>
-                <a:uFill>
-                  <a:solidFill>
-                    <a:srgbClr val="FFFFFF"/>
-                  </a:solidFill>
-                </a:uFill>
-                <a:latin typeface="Calibri"/>
-              </a:rPr>
-              <a:t>This is help avoid dependency clashes with your code</a:t>
+              <a:rPr lang="en-US" sz="2800" b="0" strike="noStrike" spc="-1" dirty="0">
+                <a:solidFill>
+                  <a:srgbClr val="000000"/>
+                </a:solidFill>
+                <a:uFill>
+                  <a:solidFill>
+                    <a:srgbClr val="FFFFFF"/>
+                  </a:solidFill>
+                </a:uFill>
+                <a:latin typeface="Calibri"/>
+              </a:rPr>
+              <a:t>This </a:t>
+            </a:r>
+            <a:r>
+              <a:rPr lang="en-US" sz="2800" b="0" strike="noStrike" spc="-1" dirty="0" smtClean="0">
+                <a:solidFill>
+                  <a:srgbClr val="000000"/>
+                </a:solidFill>
+                <a:uFill>
+                  <a:solidFill>
+                    <a:srgbClr val="FFFFFF"/>
+                  </a:solidFill>
+                </a:uFill>
+                <a:latin typeface="Calibri"/>
+              </a:rPr>
+              <a:t>prevents </a:t>
+            </a:r>
+            <a:r>
+              <a:rPr lang="en-US" sz="2800" b="0" strike="noStrike" spc="-1" dirty="0">
+                <a:solidFill>
+                  <a:srgbClr val="000000"/>
+                </a:solidFill>
+                <a:uFill>
+                  <a:solidFill>
+                    <a:srgbClr val="FFFFFF"/>
+                  </a:solidFill>
+                </a:uFill>
+                <a:latin typeface="Calibri"/>
+              </a:rPr>
+              <a:t>dependency clashes with your code</a:t>
             </a:r>
           </a:p>
           <a:p>
@@ -8448,7 +8545,7 @@
                 <a:srgbClr val="34AD91"/>
               </a:buClr>
             </a:pPr>
-            <a:endParaRPr lang="en-US" sz="2800" spc="-1">
+            <a:endParaRPr lang="en-US" sz="2800" spc="-1" dirty="0">
               <a:solidFill>
                 <a:srgbClr val="000000"/>
               </a:solidFill>
@@ -8472,7 +8569,7 @@
               <a:buChar char=""/>
             </a:pPr>
             <a:r>
-              <a:rPr lang="en-US" sz="2800" b="0" strike="noStrike" spc="-1">
+              <a:rPr lang="en-US" sz="2800" b="0" strike="noStrike" spc="-1" dirty="0">
                 <a:solidFill>
                   <a:srgbClr val="000000"/>
                 </a:solidFill>
@@ -8495,19 +8592,44 @@
               <a:buChar char=""/>
             </a:pPr>
             <a:r>
-              <a:rPr lang="en-US" sz="2400" spc="-1">
-                <a:solidFill>
-                  <a:srgbClr val="000000"/>
-                </a:solidFill>
-                <a:uFill>
-                  <a:solidFill>
-                    <a:srgbClr val="FFFFFF"/>
-                  </a:solidFill>
-                </a:uFill>
-                <a:latin typeface="Calibri"/>
-              </a:rPr>
-              <a:t>Copy the JAR files into the lib folder of each TaskManager</a:t>
-            </a:r>
+              <a:rPr lang="en-US" sz="2400" spc="-1" dirty="0">
+                <a:solidFill>
+                  <a:srgbClr val="000000"/>
+                </a:solidFill>
+                <a:uFill>
+                  <a:solidFill>
+                    <a:srgbClr val="FFFFFF"/>
+                  </a:solidFill>
+                </a:uFill>
+                <a:latin typeface="Calibri"/>
+              </a:rPr>
+              <a:t>Copy the JAR files into the lib folder of each </a:t>
+            </a:r>
+            <a:r>
+              <a:rPr lang="en-US" sz="2400" spc="-1" dirty="0" err="1">
+                <a:solidFill>
+                  <a:srgbClr val="000000"/>
+                </a:solidFill>
+                <a:uFill>
+                  <a:solidFill>
+                    <a:srgbClr val="FFFFFF"/>
+                  </a:solidFill>
+                </a:uFill>
+                <a:latin typeface="Calibri"/>
+              </a:rPr>
+              <a:t>TaskManager</a:t>
+            </a:r>
+            <a:endParaRPr lang="en-US" sz="2400" spc="-1" dirty="0">
+              <a:solidFill>
+                <a:srgbClr val="000000"/>
+              </a:solidFill>
+              <a:uFill>
+                <a:solidFill>
+                  <a:srgbClr val="FFFFFF"/>
+                </a:solidFill>
+              </a:uFill>
+              <a:latin typeface="Calibri"/>
+            </a:endParaRPr>
           </a:p>
           <a:p>
             <a:pPr marL="800280" lvl="1" indent="-342720">
@@ -8518,7 +8640,7 @@
               <a:buChar char=""/>
             </a:pPr>
             <a:r>
-              <a:rPr lang="en-US" sz="2400" b="0" strike="noStrike" spc="-1">
+              <a:rPr lang="en-US" sz="2400" b="0" strike="noStrike" spc="-1" dirty="0">
                 <a:solidFill>
                   <a:srgbClr val="000000"/>
                 </a:solidFill>
@@ -8540,7 +8662,7 @@
               <a:buFont typeface="Wingdings" charset="2"/>
               <a:buChar char=""/>
             </a:pPr>
-            <a:endParaRPr lang="en-US" sz="2400" spc="-1">
+            <a:endParaRPr lang="en-US" sz="2400" spc="-1" dirty="0">
               <a:solidFill>
                 <a:srgbClr val="000000"/>
               </a:solidFill>
@@ -8561,7 +8683,7 @@
               <a:buChar char=""/>
             </a:pPr>
             <a:r>
-              <a:rPr lang="en-US" sz="2800" b="0" strike="noStrike" spc="-1">
+              <a:rPr lang="en-US" sz="2800" b="0" strike="noStrike" spc="-1" dirty="0">
                 <a:solidFill>
                   <a:srgbClr val="000000"/>
                 </a:solidFill>
@@ -8582,7 +8704,7 @@
               </a:buClr>
             </a:pPr>
             <a:r>
-              <a:rPr lang="en-US" sz="1600" spc="-1">
+              <a:rPr lang="en-US" sz="1600" spc="-1" dirty="0">
                 <a:solidFill>
                   <a:srgbClr val="000000"/>
                 </a:solidFill>
@@ -8595,7 +8717,7 @@
               </a:rPr>
               <a:t>https://ci.apache.org/projects/flink/flink-docs-release-1.1/apis/cluster_execution.html#linking-with-modules-not-contained-in-the-binary-distribution</a:t>
             </a:r>
-            <a:endParaRPr lang="en-US" sz="1600" spc="-1">
+            <a:endParaRPr lang="en-US" sz="1600" spc="-1" dirty="0">
               <a:solidFill>
                 <a:srgbClr val="000000"/>
               </a:solidFill>
@@ -9017,7 +9139,7 @@
               <a:buChar char=""/>
             </a:pPr>
             <a:r>
-              <a:rPr lang="en-US" sz="2400" b="0" strike="noStrike" spc="-1">
+              <a:rPr lang="en-US" sz="2400" b="0" strike="noStrike" spc="-1" dirty="0">
                 <a:solidFill>
                   <a:srgbClr val="000000"/>
                 </a:solidFill>
@@ -9032,7 +9154,7 @@
             </a:r>
           </a:p>
           <a:p>
-            <a:endParaRPr lang="en-US" sz="2400" b="0" strike="noStrike" spc="-1">
+            <a:endParaRPr lang="en-US" sz="2400" b="0" strike="noStrike" spc="-1" dirty="0">
               <a:solidFill>
                 <a:srgbClr val="000000"/>
               </a:solidFill>
@@ -9056,7 +9178,7 @@
               <a:buChar char=""/>
             </a:pPr>
             <a:r>
-              <a:rPr lang="en-US" sz="2400" b="0" strike="noStrike" spc="-1">
+              <a:rPr lang="en-US" sz="2400" b="0" strike="noStrike" spc="-1" dirty="0">
                 <a:solidFill>
                   <a:srgbClr val="000000"/>
                 </a:solidFill>
@@ -9071,7 +9193,7 @@
             </a:r>
           </a:p>
           <a:p>
-            <a:endParaRPr lang="en-US" sz="2400" b="0" strike="noStrike" spc="-1">
+            <a:endParaRPr lang="en-US" sz="2400" b="0" strike="noStrike" spc="-1" dirty="0">
               <a:solidFill>
                 <a:srgbClr val="000000"/>
               </a:solidFill>
@@ -9095,22 +9217,148 @@
               <a:buChar char=""/>
             </a:pPr>
             <a:r>
-              <a:rPr lang="en-US" sz="2400" b="0" strike="noStrike" spc="-1">
-                <a:solidFill>
-                  <a:srgbClr val="000000"/>
-                </a:solidFill>
-                <a:uFill>
-                  <a:solidFill>
-                    <a:srgbClr val="FFFFFF"/>
-                  </a:solidFill>
-                </a:uFill>
-                <a:latin typeface="Calibri"/>
-              </a:rPr>
-              <a:t>A Kafka topic can be read by Flink to produce a DataStream, and a DataStream can be written to a Kafka topic</a:t>
-            </a:r>
-          </a:p>
-          <a:p>
-            <a:endParaRPr lang="en-US" sz="2400" b="0" strike="noStrike" spc="-1">
+              <a:rPr lang="en-US" sz="2400" b="0" strike="noStrike" spc="-1" dirty="0" smtClean="0">
+                <a:solidFill>
+                  <a:srgbClr val="000000"/>
+                </a:solidFill>
+                <a:uFill>
+                  <a:solidFill>
+                    <a:srgbClr val="FFFFFF"/>
+                  </a:solidFill>
+                </a:uFill>
+                <a:latin typeface="Calibri"/>
+              </a:rPr>
+              <a:t>Flink can read a </a:t>
+            </a:r>
+            <a:r>
+              <a:rPr lang="en-US" sz="2400" b="0" strike="noStrike" spc="-1" dirty="0">
+                <a:solidFill>
+                  <a:srgbClr val="000000"/>
+                </a:solidFill>
+                <a:uFill>
+                  <a:solidFill>
+                    <a:srgbClr val="FFFFFF"/>
+                  </a:solidFill>
+                </a:uFill>
+                <a:latin typeface="Calibri"/>
+              </a:rPr>
+              <a:t>Kafka topic </a:t>
+            </a:r>
+            <a:r>
+              <a:rPr lang="en-US" sz="2400" b="0" strike="noStrike" spc="-1" dirty="0" smtClean="0">
+                <a:solidFill>
+                  <a:srgbClr val="000000"/>
+                </a:solidFill>
+                <a:uFill>
+                  <a:solidFill>
+                    <a:srgbClr val="FFFFFF"/>
+                  </a:solidFill>
+                </a:uFill>
+                <a:latin typeface="Calibri"/>
+              </a:rPr>
+              <a:t>to </a:t>
+            </a:r>
+            <a:r>
+              <a:rPr lang="en-US" sz="2400" b="0" strike="noStrike" spc="-1" dirty="0">
+                <a:solidFill>
+                  <a:srgbClr val="000000"/>
+                </a:solidFill>
+                <a:uFill>
+                  <a:solidFill>
+                    <a:srgbClr val="FFFFFF"/>
+                  </a:solidFill>
+                </a:uFill>
+                <a:latin typeface="Calibri"/>
+              </a:rPr>
+              <a:t>produce a </a:t>
+            </a:r>
+            <a:r>
+              <a:rPr lang="en-US" sz="2400" b="0" strike="noStrike" spc="-1" dirty="0" smtClean="0">
+                <a:solidFill>
+                  <a:srgbClr val="000000"/>
+                </a:solidFill>
+                <a:uFill>
+                  <a:solidFill>
+                    <a:srgbClr val="FFFFFF"/>
+                  </a:solidFill>
+                </a:uFill>
+                <a:latin typeface="Calibri"/>
+              </a:rPr>
+              <a:t>DataStream</a:t>
+            </a:r>
+            <a:r>
+              <a:rPr lang="en-US" sz="2400" spc="-1" dirty="0">
+                <a:solidFill>
+                  <a:srgbClr val="000000"/>
+                </a:solidFill>
+                <a:uFill>
+                  <a:solidFill>
+                    <a:srgbClr val="FFFFFF"/>
+                  </a:solidFill>
+                </a:uFill>
+                <a:latin typeface="Calibri"/>
+              </a:rPr>
+              <a:t> </a:t>
+            </a:r>
+            <a:r>
+              <a:rPr lang="en-US" sz="2400" b="0" strike="noStrike" spc="-1" dirty="0" smtClean="0">
+                <a:solidFill>
+                  <a:srgbClr val="000000"/>
+                </a:solidFill>
+                <a:uFill>
+                  <a:solidFill>
+                    <a:srgbClr val="FFFFFF"/>
+                  </a:solidFill>
+                </a:uFill>
+                <a:latin typeface="Calibri"/>
+              </a:rPr>
+              <a:t>and write a </a:t>
+            </a:r>
+            <a:r>
+              <a:rPr lang="en-US" sz="2400" b="0" strike="noStrike" spc="-1" dirty="0">
+                <a:solidFill>
+                  <a:srgbClr val="000000"/>
+                </a:solidFill>
+                <a:uFill>
+                  <a:solidFill>
+                    <a:srgbClr val="FFFFFF"/>
+                  </a:solidFill>
+                </a:uFill>
+                <a:latin typeface="Calibri"/>
+              </a:rPr>
+              <a:t>DataStream </a:t>
+            </a:r>
+            <a:r>
+              <a:rPr lang="en-US" sz="2400" b="0" strike="noStrike" spc="-1" dirty="0" smtClean="0">
+                <a:solidFill>
+                  <a:srgbClr val="000000"/>
+                </a:solidFill>
+                <a:uFill>
+                  <a:solidFill>
+                    <a:srgbClr val="FFFFFF"/>
+                  </a:solidFill>
+                </a:uFill>
+                <a:latin typeface="Calibri"/>
+              </a:rPr>
+              <a:t>to </a:t>
+            </a:r>
+            <a:r>
+              <a:rPr lang="en-US" sz="2400" b="0" strike="noStrike" spc="-1" dirty="0">
+                <a:solidFill>
+                  <a:srgbClr val="000000"/>
+                </a:solidFill>
+                <a:uFill>
+                  <a:solidFill>
+                    <a:srgbClr val="FFFFFF"/>
+                  </a:solidFill>
+                </a:uFill>
+                <a:latin typeface="Calibri"/>
+              </a:rPr>
+              <a:t>a Kafka topic</a:t>
+            </a:r>
+          </a:p>
+          <a:p>
+            <a:endParaRPr lang="en-US" sz="2400" b="0" strike="noStrike" spc="-1" dirty="0">
               <a:solidFill>
                 <a:srgbClr val="000000"/>
               </a:solidFill>
@@ -9134,7 +9382,7 @@
               <a:buChar char=""/>
             </a:pPr>
             <a:r>
-              <a:rPr lang="en-US" sz="2400" b="0" strike="noStrike" spc="-1">
+              <a:rPr lang="en-US" sz="2400" b="0" strike="noStrike" spc="-1" dirty="0">
                 <a:solidFill>
                   <a:srgbClr val="000000"/>
                 </a:solidFill>
@@ -9154,7 +9402,7 @@
                 <a:spcPct val="100000"/>
               </a:lnSpc>
             </a:pPr>
-            <a:endParaRPr lang="en-US" sz="2400" b="0" strike="noStrike" spc="-1">
+            <a:endParaRPr lang="en-US" sz="2400" b="0" strike="noStrike" spc="-1" dirty="0">
               <a:solidFill>
                 <a:srgbClr val="000000"/>
               </a:solidFill>
@@ -9369,7 +9617,7 @@
               <a:buChar char=""/>
             </a:pPr>
             <a:r>
-              <a:rPr lang="en-US" sz="2800" b="0" strike="noStrike" spc="-1">
+              <a:rPr lang="en-US" sz="2800" b="0" strike="noStrike" spc="-1" dirty="0">
                 <a:solidFill>
                   <a:srgbClr val="000000"/>
                 </a:solidFill>
@@ -9389,7 +9637,7 @@
                 <a:spcPct val="100000"/>
               </a:lnSpc>
             </a:pPr>
-            <a:endParaRPr lang="en-US" b="0" strike="noStrike" spc="-1">
+            <a:endParaRPr lang="en-US" b="0" strike="noStrike" spc="-1" dirty="0">
               <a:solidFill>
                 <a:srgbClr val="000000"/>
               </a:solidFill>
@@ -9408,7 +9656,7 @@
               </a:lnSpc>
             </a:pPr>
             <a:r>
-              <a:rPr lang="en-US" b="0" strike="noStrike" spc="-1">
+              <a:rPr lang="en-US" b="0" strike="noStrike" spc="-1" dirty="0">
                 <a:solidFill>
                   <a:srgbClr val="000000"/>
                 </a:solidFill>
@@ -9422,7 +9670,7 @@
               <a:t>Properties props = </a:t>
             </a:r>
             <a:r>
-              <a:rPr lang="en-US" b="1" strike="noStrike" spc="-1">
+              <a:rPr lang="en-US" b="1" strike="noStrike" spc="-1" dirty="0">
                 <a:solidFill>
                   <a:srgbClr val="000090"/>
                 </a:solidFill>
@@ -9436,7 +9684,7 @@
               <a:t>new</a:t>
             </a:r>
             <a:r>
-              <a:rPr lang="en-US" b="0" strike="noStrike" spc="-1">
+              <a:rPr lang="en-US" b="0" strike="noStrike" spc="-1" dirty="0">
                 <a:solidFill>
                   <a:srgbClr val="000000"/>
                 </a:solidFill>
@@ -9449,7 +9697,7 @@
               </a:rPr>
               <a:t> Properties();</a:t>
             </a:r>
-            <a:endParaRPr lang="en-US" b="0" strike="noStrike" spc="-1">
+            <a:endParaRPr lang="en-US" b="0" strike="noStrike" spc="-1" dirty="0">
               <a:solidFill>
                 <a:srgbClr val="000000"/>
               </a:solidFill>
@@ -9468,7 +9716,7 @@
               </a:lnSpc>
             </a:pPr>
             <a:r>
-              <a:rPr lang="en-US" b="0" strike="noStrike" spc="-1">
+              <a:rPr lang="en-US" b="0" strike="noStrike" spc="-1" dirty="0" err="1">
                 <a:solidFill>
                   <a:srgbClr val="000000"/>
                 </a:solidFill>
@@ -9479,10 +9727,24 @@
                 </a:uFill>
                 <a:latin typeface="Consolas"/>
               </a:rPr>
-              <a:t>props.setProperty(</a:t>
-            </a:r>
-            <a:r>
-              <a:rPr lang="en-US" b="1" strike="noStrike" spc="-1">
+              <a:t>props.setProperty</a:t>
+            </a:r>
+            <a:r>
+              <a:rPr lang="en-US" b="0" strike="noStrike" spc="-1" dirty="0">
+                <a:solidFill>
+                  <a:srgbClr val="000000"/>
+                </a:solidFill>
+                <a:uFill>
+                  <a:solidFill>
+                    <a:srgbClr val="FFFFFF"/>
+                  </a:solidFill>
+                </a:uFill>
+                <a:latin typeface="Consolas"/>
+              </a:rPr>
+              <a:t>(</a:t>
+            </a:r>
+            <a:r>
+              <a:rPr lang="en-US" b="1" strike="noStrike" spc="-1" dirty="0">
                 <a:solidFill>
                   <a:srgbClr val="008000"/>
                 </a:solidFill>
@@ -9493,12 +9755,12 @@
                 </a:uFill>
                 <a:latin typeface="Consolas"/>
               </a:rPr>
-              <a:t>"zookeeper.connect"</a:t>
-            </a:r>
-            <a:r>
-              <a:rPr lang="en-US" b="0" strike="noStrike" spc="-1">
-                <a:solidFill>
-                  <a:srgbClr val="000000"/>
+              <a:t>"</a:t>
+            </a:r>
+            <a:r>
+              <a:rPr lang="en-US" b="1" strike="noStrike" spc="-1" dirty="0" err="1">
+                <a:solidFill>
+                  <a:srgbClr val="008000"/>
                 </a:solidFill>
                 <a:uFill>
                   <a:solidFill>
@@ -9507,10 +9769,38 @@
                 </a:uFill>
                 <a:latin typeface="Consolas"/>
               </a:rPr>
+              <a:t>zookeeper.connect</a:t>
+            </a:r>
+            <a:r>
+              <a:rPr lang="en-US" b="1" strike="noStrike" spc="-1" dirty="0">
+                <a:solidFill>
+                  <a:srgbClr val="008000"/>
+                </a:solidFill>
+                <a:uFill>
+                  <a:solidFill>
+                    <a:srgbClr val="FFFFFF"/>
+                  </a:solidFill>
+                </a:uFill>
+                <a:latin typeface="Consolas"/>
+              </a:rPr>
+              <a:t>"</a:t>
+            </a:r>
+            <a:r>
+              <a:rPr lang="en-US" b="0" strike="noStrike" spc="-1" dirty="0">
+                <a:solidFill>
+                  <a:srgbClr val="000000"/>
+                </a:solidFill>
+                <a:uFill>
+                  <a:solidFill>
+                    <a:srgbClr val="FFFFFF"/>
+                  </a:solidFill>
+                </a:uFill>
+                <a:latin typeface="Consolas"/>
+              </a:rPr>
               <a:t>, </a:t>
             </a:r>
             <a:r>
-              <a:rPr lang="en-US" b="1" strike="noStrike" spc="-1">
+              <a:rPr lang="en-US" b="1" strike="noStrike" spc="-1" dirty="0">
                 <a:solidFill>
                   <a:srgbClr val="008000"/>
                 </a:solidFill>
@@ -9524,7 +9814,7 @@
               <a:t>"localhost:2181"</a:t>
             </a:r>
             <a:r>
-              <a:rPr lang="en-US" b="0" strike="noStrike" spc="-1">
+              <a:rPr lang="en-US" b="0" strike="noStrike" spc="-1" dirty="0">
                 <a:solidFill>
                   <a:srgbClr val="000000"/>
                 </a:solidFill>
@@ -9537,7 +9827,7 @@
               </a:rPr>
               <a:t>);</a:t>
             </a:r>
-            <a:endParaRPr lang="en-US" b="0" strike="noStrike" spc="-1">
+            <a:endParaRPr lang="en-US" b="0" strike="noStrike" spc="-1" dirty="0">
               <a:solidFill>
                 <a:srgbClr val="000000"/>
               </a:solidFill>
@@ -9556,7 +9846,7 @@
               </a:lnSpc>
             </a:pPr>
             <a:r>
-              <a:rPr lang="en-US" b="0" strike="noStrike" spc="-1">
+              <a:rPr lang="en-US" b="0" strike="noStrike" spc="-1" dirty="0" err="1">
                 <a:solidFill>
                   <a:srgbClr val="000000"/>
                 </a:solidFill>
@@ -9567,10 +9857,24 @@
                 </a:uFill>
                 <a:latin typeface="Consolas"/>
               </a:rPr>
-              <a:t>props.setProperty(</a:t>
-            </a:r>
-            <a:r>
-              <a:rPr lang="en-US" b="1" strike="noStrike" spc="-1">
+              <a:t>props.setProperty</a:t>
+            </a:r>
+            <a:r>
+              <a:rPr lang="en-US" b="0" strike="noStrike" spc="-1" dirty="0">
+                <a:solidFill>
+                  <a:srgbClr val="000000"/>
+                </a:solidFill>
+                <a:uFill>
+                  <a:solidFill>
+                    <a:srgbClr val="FFFFFF"/>
+                  </a:solidFill>
+                </a:uFill>
+                <a:latin typeface="Consolas"/>
+              </a:rPr>
+              <a:t>(</a:t>
+            </a:r>
+            <a:r>
+              <a:rPr lang="en-US" b="1" strike="noStrike" spc="-1" dirty="0">
                 <a:solidFill>
                   <a:srgbClr val="008000"/>
                 </a:solidFill>
@@ -9581,12 +9885,12 @@
                 </a:uFill>
                 <a:latin typeface="Consolas"/>
               </a:rPr>
-              <a:t>"bootstrap.servers"</a:t>
-            </a:r>
-            <a:r>
-              <a:rPr lang="en-US" b="0" strike="noStrike" spc="-1">
-                <a:solidFill>
-                  <a:srgbClr val="000000"/>
+              <a:t>"</a:t>
+            </a:r>
+            <a:r>
+              <a:rPr lang="en-US" b="1" strike="noStrike" spc="-1" dirty="0" err="1">
+                <a:solidFill>
+                  <a:srgbClr val="008000"/>
                 </a:solidFill>
                 <a:uFill>
                   <a:solidFill>
@@ -9595,10 +9899,38 @@
                 </a:uFill>
                 <a:latin typeface="Consolas"/>
               </a:rPr>
+              <a:t>bootstrap.servers</a:t>
+            </a:r>
+            <a:r>
+              <a:rPr lang="en-US" b="1" strike="noStrike" spc="-1" dirty="0">
+                <a:solidFill>
+                  <a:srgbClr val="008000"/>
+                </a:solidFill>
+                <a:uFill>
+                  <a:solidFill>
+                    <a:srgbClr val="FFFFFF"/>
+                  </a:solidFill>
+                </a:uFill>
+                <a:latin typeface="Consolas"/>
+              </a:rPr>
+              <a:t>"</a:t>
+            </a:r>
+            <a:r>
+              <a:rPr lang="en-US" b="0" strike="noStrike" spc="-1" dirty="0">
+                <a:solidFill>
+                  <a:srgbClr val="000000"/>
+                </a:solidFill>
+                <a:uFill>
+                  <a:solidFill>
+                    <a:srgbClr val="FFFFFF"/>
+                  </a:solidFill>
+                </a:uFill>
+                <a:latin typeface="Consolas"/>
+              </a:rPr>
               <a:t>, </a:t>
             </a:r>
             <a:r>
-              <a:rPr lang="en-US" b="1" strike="noStrike" spc="-1">
+              <a:rPr lang="en-US" b="1" strike="noStrike" spc="-1" dirty="0">
                 <a:solidFill>
                   <a:srgbClr val="008000"/>
                 </a:solidFill>
@@ -9612,7 +9944,7 @@
               <a:t>"localhost:9092"</a:t>
             </a:r>
             <a:r>
-              <a:rPr lang="en-US" b="0" strike="noStrike" spc="-1">
+              <a:rPr lang="en-US" b="0" strike="noStrike" spc="-1" dirty="0">
                 <a:solidFill>
                   <a:srgbClr val="000000"/>
                 </a:solidFill>
@@ -9625,7 +9957,7 @@
               </a:rPr>
               <a:t>);</a:t>
             </a:r>
-            <a:endParaRPr lang="en-US" b="0" strike="noStrike" spc="-1">
+            <a:endParaRPr lang="en-US" b="0" strike="noStrike" spc="-1" dirty="0">
               <a:solidFill>
                 <a:srgbClr val="000000"/>
               </a:solidFill>
@@ -9644,7 +9976,7 @@
               </a:lnSpc>
             </a:pPr>
             <a:r>
-              <a:rPr lang="en-US" b="0" strike="noStrike" spc="-1">
+              <a:rPr lang="en-US" b="0" strike="noStrike" spc="-1" dirty="0" err="1">
                 <a:solidFill>
                   <a:srgbClr val="000000"/>
                 </a:solidFill>
@@ -9655,10 +9987,24 @@
                 </a:uFill>
                 <a:latin typeface="Consolas"/>
               </a:rPr>
-              <a:t>props.setProperty(</a:t>
-            </a:r>
-            <a:r>
-              <a:rPr lang="en-US" b="1" strike="noStrike" spc="-1">
+              <a:t>props.setProperty</a:t>
+            </a:r>
+            <a:r>
+              <a:rPr lang="en-US" b="0" strike="noStrike" spc="-1" dirty="0">
+                <a:solidFill>
+                  <a:srgbClr val="000000"/>
+                </a:solidFill>
+                <a:uFill>
+                  <a:solidFill>
+                    <a:srgbClr val="FFFFFF"/>
+                  </a:solidFill>
+                </a:uFill>
+                <a:latin typeface="Consolas"/>
+              </a:rPr>
+              <a:t>(</a:t>
+            </a:r>
+            <a:r>
+              <a:rPr lang="en-US" b="1" strike="noStrike" spc="-1" dirty="0">
                 <a:solidFill>
                   <a:srgbClr val="008000"/>
                 </a:solidFill>
@@ -9669,12 +10015,12 @@
                 </a:uFill>
                 <a:latin typeface="Consolas"/>
               </a:rPr>
-              <a:t>"group.id"</a:t>
-            </a:r>
-            <a:r>
-              <a:rPr lang="en-US" b="0" strike="noStrike" spc="-1">
-                <a:solidFill>
-                  <a:srgbClr val="000000"/>
+              <a:t>"</a:t>
+            </a:r>
+            <a:r>
+              <a:rPr lang="en-US" b="1" strike="noStrike" spc="-1" dirty="0" err="1">
+                <a:solidFill>
+                  <a:srgbClr val="008000"/>
                 </a:solidFill>
                 <a:uFill>
                   <a:solidFill>
@@ -9683,10 +10029,38 @@
                 </a:uFill>
                 <a:latin typeface="Consolas"/>
               </a:rPr>
+              <a:t>group.id</a:t>
+            </a:r>
+            <a:r>
+              <a:rPr lang="en-US" b="1" strike="noStrike" spc="-1" dirty="0">
+                <a:solidFill>
+                  <a:srgbClr val="008000"/>
+                </a:solidFill>
+                <a:uFill>
+                  <a:solidFill>
+                    <a:srgbClr val="FFFFFF"/>
+                  </a:solidFill>
+                </a:uFill>
+                <a:latin typeface="Consolas"/>
+              </a:rPr>
+              <a:t>"</a:t>
+            </a:r>
+            <a:r>
+              <a:rPr lang="en-US" b="0" strike="noStrike" spc="-1" dirty="0">
+                <a:solidFill>
+                  <a:srgbClr val="000000"/>
+                </a:solidFill>
+                <a:uFill>
+                  <a:solidFill>
+                    <a:srgbClr val="FFFFFF"/>
+                  </a:solidFill>
+                </a:uFill>
+                <a:latin typeface="Consolas"/>
+              </a:rPr>
               <a:t>, </a:t>
             </a:r>
             <a:r>
-              <a:rPr lang="en-US" b="1" strike="noStrike" spc="-1">
+              <a:rPr lang="en-US" b="1" strike="noStrike" spc="-1" dirty="0">
                 <a:solidFill>
                   <a:srgbClr val="008000"/>
                 </a:solidFill>
@@ -9697,10 +10071,38 @@
                 </a:uFill>
                 <a:latin typeface="Consolas"/>
               </a:rPr>
-              <a:t>"myGroup"</a:t>
-            </a:r>
-            <a:r>
-              <a:rPr lang="en-US" b="0" strike="noStrike" spc="-1">
+              <a:t>"</a:t>
+            </a:r>
+            <a:r>
+              <a:rPr lang="en-US" b="1" strike="noStrike" spc="-1" dirty="0" err="1">
+                <a:solidFill>
+                  <a:srgbClr val="008000"/>
+                </a:solidFill>
+                <a:uFill>
+                  <a:solidFill>
+                    <a:srgbClr val="FFFFFF"/>
+                  </a:solidFill>
+                </a:uFill>
+                <a:latin typeface="Consolas"/>
+              </a:rPr>
+              <a:t>myGroup</a:t>
+            </a:r>
+            <a:r>
+              <a:rPr lang="en-US" b="1" strike="noStrike" spc="-1" dirty="0">
+                <a:solidFill>
+                  <a:srgbClr val="008000"/>
+                </a:solidFill>
+                <a:uFill>
+                  <a:solidFill>
+                    <a:srgbClr val="FFFFFF"/>
+                  </a:solidFill>
+                </a:uFill>
+                <a:latin typeface="Consolas"/>
+              </a:rPr>
+              <a:t>"</a:t>
+            </a:r>
+            <a:r>
+              <a:rPr lang="en-US" b="0" strike="noStrike" spc="-1" dirty="0">
                 <a:solidFill>
                   <a:srgbClr val="000000"/>
                 </a:solidFill>
@@ -9715,7 +10117,7 @@
 </a:t>
             </a:r>
             <a:r>
-              <a:rPr lang="en-US" b="0" strike="noStrike" spc="-1">
+              <a:rPr lang="en-US" b="0" strike="noStrike" spc="-1" dirty="0">
                 <a:solidFill>
                   <a:schemeClr val="tx1">
                     <a:lumMod val="50000"/>
@@ -9732,7 +10134,7 @@
               <a:t>// create a data source</a:t>
             </a:r>
             <a:r>
-              <a:rPr lang="en-US" b="0" strike="noStrike" spc="-1">
+              <a:rPr lang="en-US" b="0" strike="noStrike" spc="-1" dirty="0">
                 <a:solidFill>
                   <a:srgbClr val="000000"/>
                 </a:solidFill>
@@ -9744,9 +10146,51 @@
                 <a:latin typeface="Consolas"/>
               </a:rPr>
               <a:t>
-DataStream&lt;MyData&gt; rides = env.addSource(</a:t>
-            </a:r>
-            <a:endParaRPr lang="en-US" b="0" strike="noStrike" spc="-1">
+DataStream</a:t>
+            </a:r>
+            <a:r>
+              <a:rPr lang="en-US" b="0" strike="noStrike" spc="-1" dirty="0" smtClean="0">
+                <a:solidFill>
+                  <a:srgbClr val="000000"/>
+                </a:solidFill>
+                <a:uFill>
+                  <a:solidFill>
+                    <a:srgbClr val="FFFFFF"/>
+                  </a:solidFill>
+                </a:uFill>
+                <a:latin typeface="Consolas"/>
+              </a:rPr>
+              <a:t>&lt;String&gt; data= </a:t>
+            </a:r>
+            <a:r>
+              <a:rPr lang="en-US" b="0" strike="noStrike" spc="-1" dirty="0" err="1">
+                <a:solidFill>
+                  <a:srgbClr val="000000"/>
+                </a:solidFill>
+                <a:uFill>
+                  <a:solidFill>
+                    <a:srgbClr val="FFFFFF"/>
+                  </a:solidFill>
+                </a:uFill>
+                <a:latin typeface="Consolas"/>
+              </a:rPr>
+              <a:t>env.addSource</a:t>
+            </a:r>
+            <a:r>
+              <a:rPr lang="en-US" b="0" strike="noStrike" spc="-1" dirty="0">
+                <a:solidFill>
+                  <a:srgbClr val="000000"/>
+                </a:solidFill>
+                <a:uFill>
+                  <a:solidFill>
+                    <a:srgbClr val="FFFFFF"/>
+                  </a:solidFill>
+                </a:uFill>
+                <a:latin typeface="Consolas"/>
+              </a:rPr>
+              <a:t>(</a:t>
+            </a:r>
+            <a:endParaRPr lang="en-US" b="0" strike="noStrike" spc="-1" dirty="0">
               <a:solidFill>
                 <a:srgbClr val="000000"/>
               </a:solidFill>
@@ -9765,7 +10209,7 @@
               </a:lnSpc>
             </a:pPr>
             <a:r>
-              <a:rPr lang="en-US" b="1" strike="noStrike" spc="-1">
+              <a:rPr lang="en-US" b="1" strike="noStrike" spc="-1" dirty="0">
                 <a:solidFill>
                   <a:srgbClr val="000090"/>
                 </a:solidFill>
@@ -9776,12 +10220,12 @@
                 </a:uFill>
                 <a:latin typeface="Consolas"/>
               </a:rPr>
-              <a:t>        new</a:t>
-            </a:r>
-            <a:r>
-              <a:rPr lang="en-US" b="0" strike="noStrike" spc="-1">
-                <a:solidFill>
-                  <a:srgbClr val="000000"/>
+              <a:t>    </a:t>
+            </a:r>
+            <a:r>
+              <a:rPr lang="en-US" b="1" strike="noStrike" spc="-1" dirty="0" smtClean="0">
+                <a:solidFill>
+                  <a:srgbClr val="000090"/>
                 </a:solidFill>
                 <a:uFill>
                   <a:solidFill>
@@ -9790,11 +10234,81 @@
                 </a:uFill>
                 <a:latin typeface="Consolas"/>
               </a:rPr>
-              <a:t> FlinkKafkaConsumer09&lt;MyData&gt;(
-               </a:t>
-            </a:r>
-            <a:r>
-              <a:rPr lang="en-US" b="1" strike="noStrike" spc="-1">
+              <a:t>new</a:t>
+            </a:r>
+            <a:r>
+              <a:rPr lang="en-US" b="0" strike="noStrike" spc="-1" dirty="0" smtClean="0">
+                <a:solidFill>
+                  <a:srgbClr val="000000"/>
+                </a:solidFill>
+                <a:uFill>
+                  <a:solidFill>
+                    <a:srgbClr val="FFFFFF"/>
+                  </a:solidFill>
+                </a:uFill>
+                <a:latin typeface="Consolas"/>
+              </a:rPr>
+              <a:t> </a:t>
+            </a:r>
+            <a:r>
+              <a:rPr lang="en-US" b="0" strike="noStrike" spc="-1" dirty="0">
+                <a:solidFill>
+                  <a:srgbClr val="000000"/>
+                </a:solidFill>
+                <a:uFill>
+                  <a:solidFill>
+                    <a:srgbClr val="FFFFFF"/>
+                  </a:solidFill>
+                </a:uFill>
+                <a:latin typeface="Consolas"/>
+              </a:rPr>
+              <a:t>FlinkKafkaConsumer09</a:t>
+            </a:r>
+            <a:r>
+              <a:rPr lang="en-US" b="0" strike="noStrike" spc="-1" dirty="0" smtClean="0">
+                <a:solidFill>
+                  <a:srgbClr val="000000"/>
+                </a:solidFill>
+                <a:uFill>
+                  <a:solidFill>
+                    <a:srgbClr val="FFFFFF"/>
+                  </a:solidFill>
+                </a:uFill>
+                <a:latin typeface="Consolas"/>
+              </a:rPr>
+              <a:t>&lt;String&gt;</a:t>
+            </a:r>
+            <a:r>
+              <a:rPr lang="en-US" b="0" strike="noStrike" spc="-1" dirty="0">
+                <a:solidFill>
+                  <a:srgbClr val="000000"/>
+                </a:solidFill>
+                <a:uFill>
+                  <a:solidFill>
+                    <a:srgbClr val="FFFFFF"/>
+                  </a:solidFill>
+                </a:uFill>
+                <a:latin typeface="Consolas"/>
+              </a:rPr>
+              <a:t>(
+    </a:t>
+            </a:r>
+            <a:r>
+              <a:rPr lang="en-US" b="0" strike="noStrike" spc="-1" dirty="0" smtClean="0">
+                <a:solidFill>
+                  <a:srgbClr val="000000"/>
+                </a:solidFill>
+                <a:uFill>
+                  <a:solidFill>
+                    <a:srgbClr val="FFFFFF"/>
+                  </a:solidFill>
+                </a:uFill>
+                <a:latin typeface="Consolas"/>
+              </a:rPr>
+              <a:t>    </a:t>
+            </a:r>
+            <a:r>
+              <a:rPr lang="en-US" b="1" strike="noStrike" spc="-1" dirty="0" smtClean="0">
                 <a:solidFill>
                   <a:srgbClr val="008000"/>
                 </a:solidFill>
@@ -9805,12 +10319,12 @@
                 </a:uFill>
                 <a:latin typeface="Consolas"/>
               </a:rPr>
-              <a:t>"myTopic"</a:t>
-            </a:r>
-            <a:r>
-              <a:rPr lang="en-US" b="0" strike="noStrike" spc="-1">
-                <a:solidFill>
-                  <a:srgbClr val="000000"/>
+              <a:t>"</a:t>
+            </a:r>
+            <a:r>
+              <a:rPr lang="en-US" b="1" strike="noStrike" spc="-1" dirty="0" err="1">
+                <a:solidFill>
+                  <a:srgbClr val="008000"/>
                 </a:solidFill>
                 <a:uFill>
                   <a:solidFill>
@@ -9819,11 +10333,84 @@
                 </a:uFill>
                 <a:latin typeface="Consolas"/>
               </a:rPr>
-              <a:t>,
-               </a:t>
-            </a:r>
-            <a:r>
-              <a:rPr lang="en-US" b="1" strike="noStrike" spc="-1">
+              <a:t>myTopic</a:t>
+            </a:r>
+            <a:r>
+              <a:rPr lang="en-US" b="1" strike="noStrike" spc="-1" dirty="0">
+                <a:solidFill>
+                  <a:srgbClr val="008000"/>
+                </a:solidFill>
+                <a:uFill>
+                  <a:solidFill>
+                    <a:srgbClr val="FFFFFF"/>
+                  </a:solidFill>
+                </a:uFill>
+                <a:latin typeface="Consolas"/>
+              </a:rPr>
+              <a:t>"</a:t>
+            </a:r>
+            <a:r>
+              <a:rPr lang="en-US" b="0" strike="noStrike" spc="-1" dirty="0" smtClean="0">
+                <a:solidFill>
+                  <a:srgbClr val="000000"/>
+                </a:solidFill>
+                <a:uFill>
+                  <a:solidFill>
+                    <a:srgbClr val="FFFFFF"/>
+                  </a:solidFill>
+                </a:uFill>
+                <a:latin typeface="Consolas"/>
+              </a:rPr>
+              <a:t>,                </a:t>
+            </a:r>
+            <a:r>
+              <a:rPr lang="en-US" spc="-1" dirty="0">
+                <a:solidFill>
+                  <a:schemeClr val="tx1">
+                    <a:lumMod val="50000"/>
+                    <a:lumOff val="50000"/>
+                  </a:schemeClr>
+                </a:solidFill>
+                <a:uFill>
+                  <a:solidFill>
+                    <a:srgbClr val="FFFFFF"/>
+                  </a:solidFill>
+                </a:uFill>
+                <a:latin typeface="Consolas"/>
+              </a:rPr>
+              <a:t>// Kafka topic</a:t>
+            </a:r>
+            <a:r>
+              <a:rPr lang="en-US" b="0" strike="noStrike" spc="-1" dirty="0">
+                <a:solidFill>
+                  <a:srgbClr val="000000"/>
+                </a:solidFill>
+                <a:uFill>
+                  <a:solidFill>
+                    <a:srgbClr val="FFFFFF"/>
+                  </a:solidFill>
+                </a:uFill>
+                <a:latin typeface="Consolas"/>
+              </a:rPr>
+              <a:t>
+</a:t>
+            </a:r>
+            <a:r>
+              <a:rPr lang="en-US" b="0" strike="noStrike" spc="-1" dirty="0" smtClean="0">
+                <a:solidFill>
+                  <a:srgbClr val="000000"/>
+                </a:solidFill>
+                <a:uFill>
+                  <a:solidFill>
+                    <a:srgbClr val="FFFFFF"/>
+                  </a:solidFill>
+                </a:uFill>
+                <a:latin typeface="Consolas"/>
+              </a:rPr>
+              <a:t>        </a:t>
+            </a:r>
+            <a:r>
+              <a:rPr lang="x-none" b="1" spc="-1" dirty="0" smtClean="0">
                 <a:solidFill>
                   <a:srgbClr val="000090"/>
                 </a:solidFill>
@@ -9833,11 +10420,12 @@
                   </a:solidFill>
                 </a:uFill>
                 <a:latin typeface="Consolas"/>
+                <a:cs typeface="Consolas"/>
               </a:rPr>
               <a:t>new</a:t>
             </a:r>
             <a:r>
-              <a:rPr lang="en-US" b="0" strike="noStrike" spc="-1">
+              <a:rPr lang="x-none" spc="-1" dirty="0" smtClean="0">
                 <a:solidFill>
                   <a:srgbClr val="000000"/>
                 </a:solidFill>
@@ -9847,10 +10435,133 @@
                   </a:solidFill>
                 </a:uFill>
                 <a:latin typeface="Consolas"/>
-              </a:rPr>
-              <a:t> MyDataSchema(),
-               props)</a:t>
-            </a:r>
+                <a:cs typeface="Consolas"/>
+              </a:rPr>
+              <a:t> </a:t>
+            </a:r>
+            <a:r>
+              <a:rPr lang="x-none" spc="-1" dirty="0">
+                <a:solidFill>
+                  <a:srgbClr val="000000"/>
+                </a:solidFill>
+                <a:uFill>
+                  <a:solidFill>
+                    <a:srgbClr val="FFFFFF"/>
+                  </a:solidFill>
+                </a:uFill>
+                <a:latin typeface="Consolas"/>
+                <a:cs typeface="Consolas"/>
+              </a:rPr>
+              <a:t>SimpleStringSchema()</a:t>
+            </a:r>
+            <a:r>
+              <a:rPr lang="en-US" b="0" strike="noStrike" spc="-1" dirty="0" smtClean="0">
+                <a:solidFill>
+                  <a:srgbClr val="000000"/>
+                </a:solidFill>
+                <a:uFill>
+                  <a:solidFill>
+                    <a:srgbClr val="FFFFFF"/>
+                  </a:solidFill>
+                </a:uFill>
+                <a:latin typeface="Consolas"/>
+              </a:rPr>
+              <a:t>, </a:t>
+            </a:r>
+            <a:r>
+              <a:rPr lang="en-US" spc="-1" dirty="0">
+                <a:solidFill>
+                  <a:schemeClr val="tx1">
+                    <a:lumMod val="50000"/>
+                    <a:lumOff val="50000"/>
+                  </a:schemeClr>
+                </a:solidFill>
+                <a:uFill>
+                  <a:solidFill>
+                    <a:srgbClr val="FFFFFF"/>
+                  </a:solidFill>
+                </a:uFill>
+                <a:latin typeface="Consolas"/>
+              </a:rPr>
+              <a:t>// deserialization schema</a:t>
+            </a:r>
+            <a:r>
+              <a:rPr lang="en-US" b="0" strike="noStrike" spc="-1" dirty="0">
+                <a:solidFill>
+                  <a:srgbClr val="000000"/>
+                </a:solidFill>
+                <a:uFill>
+                  <a:solidFill>
+                    <a:srgbClr val="FFFFFF"/>
+                  </a:solidFill>
+                </a:uFill>
+                <a:latin typeface="Consolas"/>
+              </a:rPr>
+              <a:t>
+</a:t>
+            </a:r>
+            <a:r>
+              <a:rPr lang="en-US" b="0" strike="noStrike" spc="-1" dirty="0" smtClean="0">
+                <a:solidFill>
+                  <a:srgbClr val="000000"/>
+                </a:solidFill>
+                <a:uFill>
+                  <a:solidFill>
+                    <a:srgbClr val="FFFFFF"/>
+                  </a:solidFill>
+                </a:uFill>
+                <a:latin typeface="Consolas"/>
+              </a:rPr>
+              <a:t>        props)                    </a:t>
+            </a:r>
+            <a:r>
+              <a:rPr lang="en-US" spc="-1" dirty="0">
+                <a:solidFill>
+                  <a:schemeClr val="tx1">
+                    <a:lumMod val="50000"/>
+                    <a:lumOff val="50000"/>
+                  </a:schemeClr>
+                </a:solidFill>
+                <a:uFill>
+                  <a:solidFill>
+                    <a:srgbClr val="FFFFFF"/>
+                  </a:solidFill>
+                </a:uFill>
+                <a:latin typeface="Consolas"/>
+              </a:rPr>
+              <a:t>// Consumer </a:t>
+            </a:r>
+            <a:r>
+              <a:rPr lang="en-US" spc="-1" dirty="0" err="1">
+                <a:solidFill>
+                  <a:schemeClr val="tx1">
+                    <a:lumMod val="50000"/>
+                    <a:lumOff val="50000"/>
+                  </a:schemeClr>
+                </a:solidFill>
+                <a:uFill>
+                  <a:solidFill>
+                    <a:srgbClr val="FFFFFF"/>
+                  </a:solidFill>
+                </a:uFill>
+                <a:latin typeface="Consolas"/>
+              </a:rPr>
+              <a:t>config</a:t>
+            </a:r>
+            <a:endParaRPr lang="en-US" spc="-1" dirty="0">
+              <a:solidFill>
+                <a:schemeClr val="tx1">
+                  <a:lumMod val="50000"/>
+                  <a:lumOff val="50000"/>
+                </a:schemeClr>
+              </a:solidFill>
+              <a:uFill>
+                <a:solidFill>
+                  <a:srgbClr val="FFFFFF"/>
+                </a:solidFill>
+              </a:uFill>
+              <a:latin typeface="Consolas"/>
+            </a:endParaRPr>
           </a:p>
           <a:p>
             <a:pPr marL="457200">
@@ -9859,7 +10570,7 @@
               </a:lnSpc>
             </a:pPr>
             <a:r>
-              <a:rPr lang="en-US" b="0" strike="noStrike" spc="-1">
+              <a:rPr lang="en-US" b="0" strike="noStrike" spc="-1" dirty="0">
                 <a:solidFill>
                   <a:srgbClr val="000000"/>
                 </a:solidFill>
@@ -9872,7 +10583,7 @@
               </a:rPr>
               <a:t>);</a:t>
             </a:r>
-            <a:endParaRPr lang="en-US" b="0" strike="noStrike" spc="-1">
+            <a:endParaRPr lang="en-US" b="0" strike="noStrike" spc="-1" dirty="0">
               <a:solidFill>
                 <a:srgbClr val="000000"/>
               </a:solidFill>
@@ -10252,7 +10963,7 @@
             </a:endParaRPr>
           </a:p>
           <a:p>
-            <a:endParaRPr lang="en-US" sz="2000" b="0" strike="noStrike" spc="-1">
+            <a:endParaRPr lang="en-US" sz="2000" b="0" strike="noStrike" spc="-1" dirty="0">
               <a:solidFill>
                 <a:srgbClr val="000000"/>
               </a:solidFill>
@@ -10267,7 +10978,7 @@
           <a:p>
             <a:pPr marL="457200"/>
             <a:r>
-              <a:rPr lang="x-none" sz="2000" b="0" strike="noStrike" spc="-1" dirty="0">
+              <a:rPr lang="x-none" b="0" strike="noStrike" spc="-1" dirty="0">
                 <a:solidFill>
                   <a:srgbClr val="000000"/>
                 </a:solidFill>
@@ -10282,7 +10993,7 @@
               <a:t>DataStream&lt;String&gt; </a:t>
             </a:r>
             <a:r>
-              <a:rPr lang="x-none" sz="2000" b="0" strike="noStrike" spc="-1" dirty="0" err="1">
+              <a:rPr lang="x-none" b="0" strike="noStrike" spc="-1" dirty="0" err="1">
                 <a:solidFill>
                   <a:srgbClr val="000000"/>
                 </a:solidFill>
@@ -10297,7 +11008,7 @@
               <a:t>aStream</a:t>
             </a:r>
             <a:r>
-              <a:rPr lang="x-none" sz="2000" b="0" strike="noStrike" spc="-1" dirty="0">
+              <a:rPr lang="x-none" b="0" strike="noStrike" spc="-1" dirty="0">
                 <a:solidFill>
                   <a:srgbClr val="000000"/>
                 </a:solidFill>
@@ -10315,7 +11026,7 @@
           <a:p>
             <a:pPr marL="457200"/>
             <a:r>
-              <a:rPr lang="x-none" sz="2000" b="0" strike="noStrike" spc="-1" dirty="0">
+              <a:rPr lang="x-none" b="0" strike="noStrike" spc="-1" dirty="0">
                 <a:solidFill>
                   <a:srgbClr val="000000"/>
                 </a:solidFill>
@@ -10333,7 +11044,7 @@
           <a:p>
             <a:pPr marL="457200"/>
             <a:r>
-              <a:rPr lang="x-none" sz="2000" b="1" strike="noStrike" spc="-1" dirty="0">
+              <a:rPr lang="x-none" b="1" strike="noStrike" spc="-1" dirty="0">
                 <a:solidFill>
                   <a:srgbClr val="000090"/>
                 </a:solidFill>
@@ -10345,12 +11056,12 @@
                 <a:latin typeface="Consolas"/>
                 <a:cs typeface="Consolas"/>
               </a:rPr>
-              <a:t>	new </a:t>
-            </a:r>
-            <a:r>
-              <a:rPr lang="x-none" sz="2000" strike="noStrike" spc="-1" dirty="0">
-                <a:solidFill>
-                  <a:srgbClr val="000000"/>
+              <a:t>	</a:t>
+            </a:r>
+            <a:r>
+              <a:rPr lang="x-none" b="1" strike="noStrike" spc="-1" dirty="0" smtClean="0">
+                <a:solidFill>
+                  <a:srgbClr val="000090"/>
                 </a:solidFill>
                 <a:uFill>
                   <a:solidFill>
@@ -10360,10 +11071,10 @@
                 <a:latin typeface="Consolas"/>
                 <a:cs typeface="Consolas"/>
               </a:rPr>
-              <a:t>FlinkKafkaProducer09&lt;String</a:t>
-            </a:r>
-            <a:r>
-              <a:rPr lang="x-none" sz="2000" b="0" strike="noStrike" spc="-1" dirty="0">
+              <a:t> new </a:t>
+            </a:r>
+            <a:r>
+              <a:rPr lang="x-none" strike="noStrike" spc="-1" dirty="0">
                 <a:solidFill>
                   <a:srgbClr val="000000"/>
                 </a:solidFill>
@@ -10375,13 +11086,10 @@
                 <a:latin typeface="Consolas"/>
                 <a:cs typeface="Consolas"/>
               </a:rPr>
-              <a:t>&gt;(</a:t>
-            </a:r>
-          </a:p>
-          <a:p>
-            <a:pPr marL="457200"/>
-            <a:r>
-              <a:rPr lang="en-US" sz="2000" b="0" strike="noStrike" spc="-1">
+              <a:t>FlinkKafkaProducer09&lt;String</a:t>
+            </a:r>
+            <a:r>
+              <a:rPr lang="x-none" b="0" strike="noStrike" spc="-1" dirty="0">
                 <a:solidFill>
                   <a:srgbClr val="000000"/>
                 </a:solidFill>
@@ -10393,12 +11101,15 @@
                 <a:latin typeface="Consolas"/>
                 <a:cs typeface="Consolas"/>
               </a:rPr>
-              <a:t>		</a:t>
-            </a:r>
-            <a:r>
-              <a:rPr lang="x-none" sz="2000" b="1" spc="-1" dirty="0">
-                <a:solidFill>
-                  <a:srgbClr val="008000"/>
+              <a:t>&gt;(</a:t>
+            </a:r>
+          </a:p>
+          <a:p>
+            <a:pPr marL="457200"/>
+            <a:r>
+              <a:rPr lang="en-US" b="0" strike="noStrike" spc="-1" dirty="0">
+                <a:solidFill>
+                  <a:srgbClr val="000000"/>
                 </a:solidFill>
                 <a:uFill>
                   <a:solidFill>
@@ -10408,12 +11119,12 @@
                 <a:latin typeface="Consolas"/>
                 <a:cs typeface="Consolas"/>
               </a:rPr>
-              <a:t>"</a:t>
-            </a:r>
-            <a:r>
-              <a:rPr lang="x-none" sz="2000" b="1" strike="noStrike" spc="-1" dirty="0">
-                <a:solidFill>
-                  <a:srgbClr val="008000"/>
+              <a:t>	</a:t>
+            </a:r>
+            <a:r>
+              <a:rPr lang="en-US" b="0" strike="noStrike" spc="-1" dirty="0" smtClean="0">
+                <a:solidFill>
+                  <a:srgbClr val="000000"/>
                 </a:solidFill>
                 <a:uFill>
                   <a:solidFill>
@@ -10423,10 +11134,10 @@
                 <a:latin typeface="Consolas"/>
                 <a:cs typeface="Consolas"/>
               </a:rPr>
-              <a:t>localhost:9092</a:t>
-            </a:r>
-            <a:r>
-              <a:rPr lang="x-none" sz="2000" b="1" spc="-1" dirty="0">
+              <a:t>     </a:t>
+            </a:r>
+            <a:r>
+              <a:rPr lang="x-none" b="1" spc="-1" dirty="0" smtClean="0">
                 <a:solidFill>
                   <a:srgbClr val="008000"/>
                 </a:solidFill>
@@ -10441,9 +11152,9 @@
               <a:t>"</a:t>
             </a:r>
             <a:r>
-              <a:rPr lang="x-none" sz="2000" b="0" strike="noStrike" spc="-1" dirty="0">
-                <a:solidFill>
-                  <a:srgbClr val="000000"/>
+              <a:rPr lang="x-none" b="1" strike="noStrike" spc="-1" dirty="0">
+                <a:solidFill>
+                  <a:srgbClr val="008000"/>
                 </a:solidFill>
                 <a:uFill>
                   <a:solidFill>
@@ -10453,12 +11164,12 @@
                 <a:latin typeface="Consolas"/>
                 <a:cs typeface="Consolas"/>
               </a:rPr>
-              <a:t>, </a:t>
-            </a:r>
-            <a:r>
-              <a:rPr lang="x-none" sz="2000" b="0" strike="noStrike" spc="-1" dirty="0">
-                <a:solidFill>
-                  <a:srgbClr val="7F7F7F"/>
+              <a:t>localhost:9092</a:t>
+            </a:r>
+            <a:r>
+              <a:rPr lang="x-none" b="1" spc="-1" dirty="0">
+                <a:solidFill>
+                  <a:srgbClr val="008000"/>
                 </a:solidFill>
                 <a:uFill>
                   <a:solidFill>
@@ -10468,13 +11179,10 @@
                 <a:latin typeface="Consolas"/>
                 <a:cs typeface="Consolas"/>
               </a:rPr>
-              <a:t>// default local broker</a:t>
-            </a:r>
-          </a:p>
-          <a:p>
-            <a:pPr marL="457200"/>
-            <a:r>
-              <a:rPr lang="en-US" sz="2000" b="0" strike="noStrike" spc="-1">
+              <a:t>"</a:t>
+            </a:r>
+            <a:r>
+              <a:rPr lang="x-none" b="0" strike="noStrike" spc="-1" dirty="0">
                 <a:solidFill>
                   <a:srgbClr val="000000"/>
                 </a:solidFill>
@@ -10486,12 +11194,12 @@
                 <a:latin typeface="Consolas"/>
                 <a:cs typeface="Consolas"/>
               </a:rPr>
-              <a:t>		</a:t>
-            </a:r>
-            <a:r>
-              <a:rPr lang="x-none" sz="2000" b="1" spc="-1" dirty="0">
-                <a:solidFill>
-                  <a:srgbClr val="008000"/>
+              <a:t>, </a:t>
+            </a:r>
+            <a:r>
+              <a:rPr lang="x-none" b="0" strike="noStrike" spc="-1" dirty="0" smtClean="0">
+                <a:solidFill>
+                  <a:srgbClr val="000000"/>
                 </a:solidFill>
                 <a:uFill>
                   <a:solidFill>
@@ -10501,12 +11209,12 @@
                 <a:latin typeface="Consolas"/>
                 <a:cs typeface="Consolas"/>
               </a:rPr>
-              <a:t>"</a:t>
-            </a:r>
-            <a:r>
-              <a:rPr lang="x-none" sz="2000" b="1" strike="noStrike" spc="-1" dirty="0" err="1">
-                <a:solidFill>
-                  <a:srgbClr val="008000"/>
+              <a:t>       </a:t>
+            </a:r>
+            <a:r>
+              <a:rPr lang="x-none" b="0" strike="noStrike" spc="-1" dirty="0" smtClean="0">
+                <a:solidFill>
+                  <a:srgbClr val="7F7F7F"/>
                 </a:solidFill>
                 <a:uFill>
                   <a:solidFill>
@@ -10516,12 +11224,12 @@
                 <a:latin typeface="Consolas"/>
                 <a:cs typeface="Consolas"/>
               </a:rPr>
-              <a:t>myTopic</a:t>
-            </a:r>
-            <a:r>
-              <a:rPr lang="x-none" sz="2000" b="1" spc="-1" dirty="0">
-                <a:solidFill>
-                  <a:srgbClr val="008000"/>
+              <a:t>// </a:t>
+            </a:r>
+            <a:r>
+              <a:rPr lang="x-none" b="0" strike="noStrike" spc="-1" dirty="0">
+                <a:solidFill>
+                  <a:srgbClr val="7F7F7F"/>
                 </a:solidFill>
                 <a:uFill>
                   <a:solidFill>
@@ -10531,10 +11239,13 @@
                 <a:latin typeface="Consolas"/>
                 <a:cs typeface="Consolas"/>
               </a:rPr>
-              <a:t>"</a:t>
-            </a:r>
-            <a:r>
-              <a:rPr lang="x-none" sz="2000" b="0" strike="noStrike" spc="-1" dirty="0">
+              <a:t>default local broker</a:t>
+            </a:r>
+          </a:p>
+          <a:p>
+            <a:pPr marL="457200"/>
+            <a:r>
+              <a:rPr lang="en-US" b="0" strike="noStrike" spc="-1" dirty="0">
                 <a:solidFill>
                   <a:srgbClr val="000000"/>
                 </a:solidFill>
@@ -10546,11 +11257,116 @@
                 <a:latin typeface="Consolas"/>
                 <a:cs typeface="Consolas"/>
               </a:rPr>
+              <a:t>	</a:t>
+            </a:r>
+            <a:r>
+              <a:rPr lang="en-US" b="0" strike="noStrike" spc="-1" dirty="0" smtClean="0">
+                <a:solidFill>
+                  <a:srgbClr val="000000"/>
+                </a:solidFill>
+                <a:uFill>
+                  <a:solidFill>
+                    <a:srgbClr val="FFFFFF"/>
+                  </a:solidFill>
+                </a:uFill>
+                <a:latin typeface="Consolas"/>
+                <a:cs typeface="Consolas"/>
+              </a:rPr>
+              <a:t>     </a:t>
+            </a:r>
+            <a:r>
+              <a:rPr lang="x-none" b="1" spc="-1" dirty="0" smtClean="0">
+                <a:solidFill>
+                  <a:srgbClr val="008000"/>
+                </a:solidFill>
+                <a:uFill>
+                  <a:solidFill>
+                    <a:srgbClr val="FFFFFF"/>
+                  </a:solidFill>
+                </a:uFill>
+                <a:latin typeface="Consolas"/>
+                <a:cs typeface="Consolas"/>
+              </a:rPr>
+              <a:t>"</a:t>
+            </a:r>
+            <a:r>
+              <a:rPr lang="x-none" b="1" strike="noStrike" spc="-1" dirty="0">
+                <a:solidFill>
+                  <a:srgbClr val="008000"/>
+                </a:solidFill>
+                <a:uFill>
+                  <a:solidFill>
+                    <a:srgbClr val="FFFFFF"/>
+                  </a:solidFill>
+                </a:uFill>
+                <a:latin typeface="Consolas"/>
+                <a:cs typeface="Consolas"/>
+              </a:rPr>
+              <a:t>myTopic</a:t>
+            </a:r>
+            <a:r>
+              <a:rPr lang="x-none" b="1" spc="-1" dirty="0">
+                <a:solidFill>
+                  <a:srgbClr val="008000"/>
+                </a:solidFill>
+                <a:uFill>
+                  <a:solidFill>
+                    <a:srgbClr val="FFFFFF"/>
+                  </a:solidFill>
+                </a:uFill>
+                <a:latin typeface="Consolas"/>
+                <a:cs typeface="Consolas"/>
+              </a:rPr>
+              <a:t>"</a:t>
+            </a:r>
+            <a:r>
+              <a:rPr lang="x-none" b="0" strike="noStrike" spc="-1" dirty="0">
+                <a:solidFill>
+                  <a:srgbClr val="000000"/>
+                </a:solidFill>
+                <a:uFill>
+                  <a:solidFill>
+                    <a:srgbClr val="FFFFFF"/>
+                  </a:solidFill>
+                </a:uFill>
+                <a:latin typeface="Consolas"/>
+                <a:cs typeface="Consolas"/>
+              </a:rPr>
               <a:t>, </a:t>
             </a:r>
-            <a:endParaRPr lang="x-none" sz="2000" spc="-1" dirty="0">
-              <a:solidFill>
-                <a:srgbClr val="000000"/>
+            <a:r>
+              <a:rPr lang="x-none" b="0" strike="noStrike" spc="-1" dirty="0" smtClean="0">
+                <a:solidFill>
+                  <a:srgbClr val="000000"/>
+                </a:solidFill>
+                <a:uFill>
+                  <a:solidFill>
+                    <a:srgbClr val="FFFFFF"/>
+                  </a:solidFill>
+                </a:uFill>
+                <a:latin typeface="Consolas"/>
+                <a:cs typeface="Consolas"/>
+              </a:rPr>
+              <a:t>              </a:t>
+            </a:r>
+            <a:r>
+              <a:rPr lang="x-none" spc="-1" dirty="0">
+                <a:solidFill>
+                  <a:srgbClr val="7F7F7F"/>
+                </a:solidFill>
+                <a:uFill>
+                  <a:solidFill>
+                    <a:srgbClr val="FFFFFF"/>
+                  </a:solidFill>
+                </a:uFill>
+                <a:latin typeface="Consolas"/>
+                <a:cs typeface="Consolas"/>
+              </a:rPr>
+              <a:t>// Kafka topic</a:t>
+            </a:r>
+            <a:endParaRPr lang="x-none" spc="-1" dirty="0">
+              <a:solidFill>
+                <a:srgbClr val="7F7F7F"/>
               </a:solidFill>
               <a:uFill>
                 <a:solidFill>
@@ -10564,7 +11380,7 @@
           <a:p>
             <a:pPr marL="457200"/>
             <a:r>
-              <a:rPr lang="x-none" sz="2000" b="1" strike="noStrike" spc="-1" dirty="0">
+              <a:rPr lang="x-none" b="1" strike="noStrike" spc="-1" dirty="0">
                 <a:solidFill>
                   <a:srgbClr val="000000"/>
                 </a:solidFill>
@@ -10576,12 +11392,12 @@
                 <a:latin typeface="Consolas"/>
                 <a:cs typeface="Consolas"/>
               </a:rPr>
-              <a:t>         </a:t>
-            </a:r>
-            <a:r>
-              <a:rPr lang="en-US" sz="2000" b="1" strike="noStrike" spc="-1">
-                <a:solidFill>
-                  <a:srgbClr val="000000"/>
+              <a:t>        </a:t>
+            </a:r>
+            <a:r>
+              <a:rPr lang="x-none" b="1" strike="noStrike" spc="-1" dirty="0" smtClean="0">
+                <a:solidFill>
+                  <a:srgbClr val="000090"/>
                 </a:solidFill>
                 <a:uFill>
                   <a:solidFill>
@@ -10591,12 +11407,12 @@
                 <a:latin typeface="Consolas"/>
                 <a:cs typeface="Consolas"/>
               </a:rPr>
-              <a:t> </a:t>
-            </a:r>
-            <a:r>
-              <a:rPr lang="x-none" sz="2000" b="1" strike="noStrike" spc="-1" dirty="0">
-                <a:solidFill>
-                  <a:srgbClr val="000090"/>
+              <a:t>new</a:t>
+            </a:r>
+            <a:r>
+              <a:rPr lang="x-none" b="0" strike="noStrike" spc="-1" dirty="0" smtClean="0">
+                <a:solidFill>
+                  <a:srgbClr val="000000"/>
                 </a:solidFill>
                 <a:uFill>
                   <a:solidFill>
@@ -10606,12 +11422,12 @@
                 <a:latin typeface="Consolas"/>
                 <a:cs typeface="Consolas"/>
               </a:rPr>
-              <a:t>new</a:t>
-            </a:r>
-            <a:r>
-              <a:rPr lang="x-none" sz="2000" b="0" strike="noStrike" spc="-1" dirty="0">
-                <a:solidFill>
-                  <a:srgbClr val="000000"/>
+              <a:t> SimpleStringSchema()) </a:t>
+            </a:r>
+            <a:r>
+              <a:rPr lang="x-none" spc="-1" dirty="0">
+                <a:solidFill>
+                  <a:srgbClr val="7F7F7F"/>
                 </a:solidFill>
                 <a:uFill>
                   <a:solidFill>
@@ -10621,10 +11437,25 @@
                 <a:latin typeface="Consolas"/>
                 <a:cs typeface="Consolas"/>
               </a:rPr>
-              <a:t> </a:t>
-            </a:r>
-            <a:r>
-              <a:rPr lang="x-none" sz="2000" b="0" strike="noStrike" spc="-1" dirty="0" err="1">
+              <a:t>// serialization schema</a:t>
+            </a:r>
+            <a:endParaRPr lang="x-none" spc="-1" dirty="0">
+              <a:solidFill>
+                <a:srgbClr val="7F7F7F"/>
+              </a:solidFill>
+              <a:uFill>
+                <a:solidFill>
+                  <a:srgbClr val="FFFFFF"/>
+                </a:solidFill>
+              </a:uFill>
+              <a:latin typeface="Consolas"/>
+              <a:cs typeface="Consolas"/>
+            </a:endParaRPr>
+          </a:p>
+          <a:p>
+            <a:pPr marL="457200"/>
+            <a:r>
+              <a:rPr lang="x-none" b="0" strike="noStrike" spc="-1" dirty="0">
                 <a:solidFill>
                   <a:srgbClr val="000000"/>
                 </a:solidFill>
@@ -10636,44 +11467,11 @@
                 <a:latin typeface="Consolas"/>
                 <a:cs typeface="Consolas"/>
               </a:rPr>
-              <a:t>SimpleStringSchema</a:t>
-            </a:r>
-            <a:r>
-              <a:rPr lang="x-none" sz="2000" b="0" strike="noStrike" spc="-1" dirty="0">
-                <a:solidFill>
-                  <a:srgbClr val="000000"/>
-                </a:solidFill>
-                <a:uFill>
-                  <a:solidFill>
-                    <a:srgbClr val="FFFFFF"/>
-                  </a:solidFill>
-                </a:uFill>
-                <a:latin typeface="Consolas"/>
-                <a:cs typeface="Consolas"/>
-              </a:rPr>
-              <a:t>)</a:t>
-            </a:r>
-          </a:p>
-          <a:p>
-            <a:pPr marL="457200"/>
-            <a:r>
-              <a:rPr lang="x-none" sz="2000" b="0" strike="noStrike" spc="-1" dirty="0">
-                <a:solidFill>
-                  <a:srgbClr val="000000"/>
-                </a:solidFill>
-                <a:uFill>
-                  <a:solidFill>
-                    <a:srgbClr val="FFFFFF"/>
-                  </a:solidFill>
-                </a:uFill>
-                <a:latin typeface="Consolas"/>
-                <a:cs typeface="Consolas"/>
-              </a:rPr>
               <a:t>);</a:t>
             </a:r>
           </a:p>
           <a:p>
-            <a:endParaRPr lang="en-US" sz="3200" b="0" strike="noStrike" spc="-1">
+            <a:endParaRPr lang="en-US" sz="3200" b="0" strike="noStrike" spc="-1" dirty="0">
               <a:solidFill>
                 <a:srgbClr val="000000"/>
               </a:solidFill>
@@ -11086,7 +11884,7 @@
               <a:buChar char=""/>
             </a:pPr>
             <a:r>
-              <a:rPr lang="en-US" sz="2800" spc="-1">
+              <a:rPr lang="en-US" sz="2800" spc="-1" dirty="0">
                 <a:solidFill>
                   <a:srgbClr val="000000"/>
                 </a:solidFill>
@@ -11100,19 +11898,44 @@
               <a:t>D</a:t>
             </a:r>
             <a:r>
-              <a:rPr lang="en-US" sz="2800" b="0" strike="noStrike" spc="-1">
-                <a:solidFill>
-                  <a:srgbClr val="000000"/>
-                </a:solidFill>
-                <a:uFill>
-                  <a:solidFill>
-                    <a:srgbClr val="FFFFFF"/>
-                  </a:solidFill>
-                </a:uFill>
-                <a:latin typeface="Calibri"/>
-              </a:rPr>
-              <a:t>istributed search engine, based on Apache Lucene</a:t>
-            </a:r>
+              <a:rPr lang="en-US" sz="2800" b="0" strike="noStrike" spc="-1" dirty="0">
+                <a:solidFill>
+                  <a:srgbClr val="000000"/>
+                </a:solidFill>
+                <a:uFill>
+                  <a:solidFill>
+                    <a:srgbClr val="FFFFFF"/>
+                  </a:solidFill>
+                </a:uFill>
+                <a:latin typeface="Calibri"/>
+              </a:rPr>
+              <a:t>istributed search engine, based on Apache </a:t>
+            </a:r>
+            <a:r>
+              <a:rPr lang="en-US" sz="2800" b="0" strike="noStrike" spc="-1" dirty="0" err="1">
+                <a:solidFill>
+                  <a:srgbClr val="000000"/>
+                </a:solidFill>
+                <a:uFill>
+                  <a:solidFill>
+                    <a:srgbClr val="FFFFFF"/>
+                  </a:solidFill>
+                </a:uFill>
+                <a:latin typeface="Calibri"/>
+              </a:rPr>
+              <a:t>Lucene</a:t>
+            </a:r>
+            <a:endParaRPr lang="en-US" sz="2800" b="0" strike="noStrike" spc="-1" dirty="0">
+              <a:solidFill>
+                <a:srgbClr val="000000"/>
+              </a:solidFill>
+              <a:uFill>
+                <a:solidFill>
+                  <a:srgbClr val="FFFFFF"/>
+                </a:solidFill>
+              </a:uFill>
+              <a:latin typeface="Calibri"/>
+            </a:endParaRPr>
           </a:p>
           <a:p>
             <a:pPr marL="343080" indent="-342720">
@@ -11122,7 +11945,7 @@
               <a:buFont typeface="Wingdings" charset="2"/>
               <a:buChar char=""/>
             </a:pPr>
-            <a:endParaRPr lang="en-US" sz="2800" b="0" strike="noStrike" spc="-1">
+            <a:endParaRPr lang="en-US" sz="2800" b="0" strike="noStrike" spc="-1" dirty="0">
               <a:solidFill>
                 <a:srgbClr val="000000"/>
               </a:solidFill>
@@ -11143,20 +11966,48 @@
               <a:buChar char=""/>
             </a:pPr>
             <a:r>
-              <a:rPr lang="en-US" sz="2800" b="0" strike="noStrike" spc="-1">
-                <a:solidFill>
-                  <a:srgbClr val="000000"/>
-                </a:solidFill>
-                <a:uFill>
-                  <a:solidFill>
-                    <a:srgbClr val="FFFFFF"/>
-                  </a:solidFill>
-                </a:uFill>
-                <a:latin typeface="Calibri"/>
-              </a:rPr>
-              <a:t>Part of an ecosystem that also includes Kibana for exploration and visualization</a:t>
-            </a:r>
-            <a:endParaRPr lang="en-US" sz="2000" b="0" strike="noStrike" spc="-1">
+              <a:rPr lang="en-US" sz="2800" b="0" strike="noStrike" spc="-1" dirty="0">
+                <a:solidFill>
+                  <a:srgbClr val="000000"/>
+                </a:solidFill>
+                <a:uFill>
+                  <a:solidFill>
+                    <a:srgbClr val="FFFFFF"/>
+                  </a:solidFill>
+                </a:uFill>
+                <a:latin typeface="Calibri"/>
+              </a:rPr>
+              <a:t>Part of an ecosystem that also includes </a:t>
+            </a:r>
+            <a:r>
+              <a:rPr lang="en-US" sz="2800" b="0" strike="noStrike" spc="-1" dirty="0" err="1">
+                <a:solidFill>
+                  <a:srgbClr val="000000"/>
+                </a:solidFill>
+                <a:uFill>
+                  <a:solidFill>
+                    <a:srgbClr val="FFFFFF"/>
+                  </a:solidFill>
+                </a:uFill>
+                <a:latin typeface="Calibri"/>
+              </a:rPr>
+              <a:t>Kibana</a:t>
+            </a:r>
+            <a:r>
+              <a:rPr lang="en-US" sz="2800" b="0" strike="noStrike" spc="-1" dirty="0">
+                <a:solidFill>
+                  <a:srgbClr val="000000"/>
+                </a:solidFill>
+                <a:uFill>
+                  <a:solidFill>
+                    <a:srgbClr val="FFFFFF"/>
+                  </a:solidFill>
+                </a:uFill>
+                <a:latin typeface="Calibri"/>
+              </a:rPr>
+              <a:t> for exploration and visualization</a:t>
+            </a:r>
+            <a:endParaRPr lang="en-US" sz="2000" b="0" strike="noStrike" spc="-1" dirty="0">
               <a:solidFill>
                 <a:srgbClr val="000000"/>
               </a:solidFill>
@@ -11179,7 +12030,7 @@
               <a:buFont typeface="Wingdings" charset="2"/>
               <a:buChar char=""/>
             </a:pPr>
-            <a:endParaRPr lang="en-US" sz="2800" b="0" strike="noStrike" spc="-1">
+            <a:endParaRPr lang="en-US" sz="2800" b="0" strike="noStrike" spc="-1" dirty="0">
               <a:solidFill>
                 <a:srgbClr val="000000"/>
               </a:solidFill>
@@ -11203,7 +12054,7 @@
               <a:buChar char=""/>
             </a:pPr>
             <a:r>
-              <a:rPr lang="en-US" sz="2800" b="0" strike="noStrike" spc="-1">
+              <a:rPr lang="en-US" sz="2800" b="0" strike="noStrike" spc="-1" dirty="0">
                 <a:solidFill>
                   <a:srgbClr val="000000"/>
                 </a:solidFill>
@@ -11228,7 +12079,7 @@
               <a:buFont typeface="Wingdings" charset="2"/>
               <a:buChar char=""/>
             </a:pPr>
-            <a:endParaRPr lang="en-US" sz="2800" spc="-1">
+            <a:endParaRPr lang="en-US" sz="2800" spc="-1" dirty="0">
               <a:solidFill>
                 <a:srgbClr val="000000"/>
               </a:solidFill>
@@ -11252,19 +12103,114 @@
               <a:buChar char=""/>
             </a:pPr>
             <a:r>
-              <a:rPr lang="en-US" sz="2800" spc="-1">
-                <a:solidFill>
-                  <a:srgbClr val="000000"/>
-                </a:solidFill>
-                <a:uFill>
-                  <a:solidFill>
-                    <a:srgbClr val="FFFFFF"/>
-                  </a:solidFill>
-                </a:uFill>
-                <a:latin typeface="Calibri"/>
-              </a:rPr>
-              <a:t>Has good defaults, but you can not modify an index mapping (schema) after inserting data</a:t>
-            </a:r>
+              <a:rPr lang="en-US" sz="2800" spc="-1" dirty="0">
+                <a:solidFill>
+                  <a:srgbClr val="000000"/>
+                </a:solidFill>
+                <a:uFill>
+                  <a:solidFill>
+                    <a:srgbClr val="FFFFFF"/>
+                  </a:solidFill>
+                </a:uFill>
+                <a:latin typeface="Calibri"/>
+              </a:rPr>
+              <a:t>Has good defaults, but you can not modify an index mapping (schema) after inserting </a:t>
+            </a:r>
+            <a:r>
+              <a:rPr lang="en-US" sz="2800" spc="-1" dirty="0" smtClean="0">
+                <a:solidFill>
+                  <a:srgbClr val="000000"/>
+                </a:solidFill>
+                <a:uFill>
+                  <a:solidFill>
+                    <a:srgbClr val="FFFFFF"/>
+                  </a:solidFill>
+                </a:uFill>
+                <a:latin typeface="Calibri"/>
+              </a:rPr>
+              <a:t>data</a:t>
+            </a:r>
+          </a:p>
+          <a:p>
+            <a:pPr marL="343080" indent="-342720">
+              <a:lnSpc>
+                <a:spcPct val="100000"/>
+              </a:lnSpc>
+              <a:buClr>
+                <a:srgbClr val="34AD91"/>
+              </a:buClr>
+              <a:buFont typeface="Wingdings" charset="2"/>
+              <a:buChar char=""/>
+            </a:pPr>
+            <a:endParaRPr lang="en-US" sz="2800" spc="-1" dirty="0">
+              <a:solidFill>
+                <a:srgbClr val="000000"/>
+              </a:solidFill>
+              <a:uFill>
+                <a:solidFill>
+                  <a:srgbClr val="FFFFFF"/>
+                </a:solidFill>
+              </a:uFill>
+              <a:latin typeface="Calibri"/>
+            </a:endParaRPr>
+          </a:p>
+          <a:p>
+            <a:pPr marL="343080" indent="-342720">
+              <a:buClr>
+                <a:srgbClr val="34AD91"/>
+              </a:buClr>
+              <a:buFont typeface="Wingdings" charset="2"/>
+              <a:buChar char=""/>
+            </a:pPr>
+            <a:r>
+              <a:rPr lang="en-US" sz="2800" spc="-1" dirty="0" err="1">
+                <a:solidFill>
+                  <a:srgbClr val="000000"/>
+                </a:solidFill>
+                <a:uFill>
+                  <a:solidFill>
+                    <a:srgbClr val="FFFFFF"/>
+                  </a:solidFill>
+                </a:uFill>
+              </a:rPr>
+              <a:t>Elasticsearch</a:t>
+            </a:r>
+            <a:r>
+              <a:rPr lang="en-US" sz="2800" spc="-1" dirty="0">
+                <a:solidFill>
+                  <a:srgbClr val="000000"/>
+                </a:solidFill>
+                <a:uFill>
+                  <a:solidFill>
+                    <a:srgbClr val="FFFFFF"/>
+                  </a:solidFill>
+                </a:uFill>
+              </a:rPr>
+              <a:t> has an HTTP-based REST API</a:t>
+            </a:r>
+          </a:p>
+          <a:p>
+            <a:pPr marL="343080" indent="-342720">
+              <a:lnSpc>
+                <a:spcPct val="100000"/>
+              </a:lnSpc>
+              <a:buClr>
+                <a:srgbClr val="34AD91"/>
+              </a:buClr>
+              <a:buFont typeface="Wingdings" charset="2"/>
+              <a:buChar char=""/>
+            </a:pPr>
+            <a:endParaRPr lang="en-US" sz="2800" spc="-1" dirty="0">
+              <a:solidFill>
+                <a:srgbClr val="000000"/>
+              </a:solidFill>
+              <a:uFill>
+                <a:solidFill>
+                  <a:srgbClr val="FFFFFF"/>
+                </a:solidFill>
+              </a:uFill>
+              <a:latin typeface="Calibri"/>
+            </a:endParaRPr>
           </a:p>
           <a:p>
             <a:pPr>
@@ -11272,7 +12218,7 @@
                 <a:spcPct val="100000"/>
               </a:lnSpc>
             </a:pPr>
-            <a:endParaRPr lang="en-US" sz="2800" b="0" strike="noStrike" spc="-1">
+            <a:endParaRPr lang="en-US" sz="2800" b="0" strike="noStrike" spc="-1" dirty="0">
               <a:solidFill>
                 <a:srgbClr val="000000"/>
               </a:solidFill>
@@ -11459,7 +12405,7 @@
         <p:spPr>
           <a:xfrm>
             <a:off x="457199" y="1474200"/>
-            <a:ext cx="8444484" cy="4651560"/>
+            <a:ext cx="8140856" cy="4651560"/>
           </a:xfrm>
           <a:prstGeom prst="rect">
             <a:avLst/>
@@ -11484,18 +12430,87 @@
               <a:buChar char=""/>
             </a:pPr>
             <a:r>
-              <a:rPr lang="en-US" sz="2800" b="0" strike="noStrike" spc="-1">
-                <a:solidFill>
-                  <a:srgbClr val="000000"/>
-                </a:solidFill>
-                <a:uFill>
-                  <a:solidFill>
-                    <a:srgbClr val="FFFFFF"/>
-                  </a:solidFill>
-                </a:uFill>
-                <a:latin typeface="Calibri"/>
-              </a:rPr>
-              <a:t>Flink has separate Sink connectors for Elasticsearch 1.x and 2.x</a:t>
+              <a:rPr lang="en-US" sz="2800" b="0" strike="noStrike" spc="-1" dirty="0">
+                <a:solidFill>
+                  <a:srgbClr val="000000"/>
+                </a:solidFill>
+                <a:uFill>
+                  <a:solidFill>
+                    <a:srgbClr val="FFFFFF"/>
+                  </a:solidFill>
+                </a:uFill>
+                <a:latin typeface="Calibri"/>
+              </a:rPr>
+              <a:t>Flink has separate Sink connectors for </a:t>
+            </a:r>
+            <a:r>
+              <a:rPr lang="en-US" sz="2800" b="0" strike="noStrike" spc="-1" dirty="0" smtClean="0">
+                <a:solidFill>
+                  <a:srgbClr val="000000"/>
+                </a:solidFill>
+                <a:uFill>
+                  <a:solidFill>
+                    <a:srgbClr val="FFFFFF"/>
+                  </a:solidFill>
+                </a:uFill>
+                <a:latin typeface="Calibri"/>
+              </a:rPr>
+              <a:t/>
+            </a:r>
+            <a:br>
+              <a:rPr lang="en-US" sz="2800" b="0" strike="noStrike" spc="-1" dirty="0" smtClean="0">
+                <a:solidFill>
+                  <a:srgbClr val="000000"/>
+                </a:solidFill>
+                <a:uFill>
+                  <a:solidFill>
+                    <a:srgbClr val="FFFFFF"/>
+                  </a:solidFill>
+                </a:uFill>
+                <a:latin typeface="Calibri"/>
+              </a:rPr>
+            </a:br>
+            <a:r>
+              <a:rPr lang="en-US" sz="2800" b="0" strike="noStrike" spc="-1" dirty="0" err="1" smtClean="0">
+                <a:solidFill>
+                  <a:srgbClr val="000000"/>
+                </a:solidFill>
+                <a:uFill>
+                  <a:solidFill>
+                    <a:srgbClr val="FFFFFF"/>
+                  </a:solidFill>
+                </a:uFill>
+                <a:latin typeface="Calibri"/>
+              </a:rPr>
+              <a:t>Elasticsearch</a:t>
+            </a:r>
+            <a:r>
+              <a:rPr lang="en-US" sz="2800" b="0" strike="noStrike" spc="-1" dirty="0" smtClean="0">
+                <a:solidFill>
+                  <a:srgbClr val="000000"/>
+                </a:solidFill>
+                <a:uFill>
+                  <a:solidFill>
+                    <a:srgbClr val="FFFFFF"/>
+                  </a:solidFill>
+                </a:uFill>
+                <a:latin typeface="Calibri"/>
+              </a:rPr>
+              <a:t> </a:t>
+            </a:r>
+            <a:r>
+              <a:rPr lang="en-US" sz="2800" b="0" strike="noStrike" spc="-1" dirty="0">
+                <a:solidFill>
+                  <a:srgbClr val="000000"/>
+                </a:solidFill>
+                <a:uFill>
+                  <a:solidFill>
+                    <a:srgbClr val="FFFFFF"/>
+                  </a:solidFill>
+                </a:uFill>
+                <a:latin typeface="Calibri"/>
+              </a:rPr>
+              <a:t>1.x and 2.x</a:t>
             </a:r>
           </a:p>
           <a:p>
@@ -11509,7 +12524,7 @@
               <a:buFont typeface="Wingdings" charset="2"/>
               <a:buChar char=""/>
             </a:pPr>
-            <a:endParaRPr lang="en-US" sz="2800" b="0" strike="noStrike" spc="-1">
+            <a:endParaRPr lang="en-US" sz="2800" b="0" strike="noStrike" spc="-1" dirty="0">
               <a:solidFill>
                 <a:srgbClr val="000000"/>
               </a:solidFill>
@@ -11533,18 +12548,60 @@
               <a:buChar char=""/>
             </a:pPr>
             <a:r>
-              <a:rPr lang="en-US" sz="2800" b="0" strike="noStrike" spc="-1">
-                <a:solidFill>
-                  <a:srgbClr val="000000"/>
-                </a:solidFill>
-                <a:uFill>
-                  <a:solidFill>
-                    <a:srgbClr val="FFFFFF"/>
-                  </a:solidFill>
-                </a:uFill>
-                <a:latin typeface="Calibri"/>
-              </a:rPr>
-              <a:t>Elasticsearch has an HTTP-based REST API</a:t>
+              <a:rPr lang="en-US" sz="2800" b="0" strike="noStrike" spc="-1" dirty="0" smtClean="0">
+                <a:solidFill>
+                  <a:srgbClr val="000000"/>
+                </a:solidFill>
+                <a:uFill>
+                  <a:solidFill>
+                    <a:srgbClr val="FFFFFF"/>
+                  </a:solidFill>
+                </a:uFill>
+                <a:latin typeface="Calibri"/>
+              </a:rPr>
+              <a:t>The </a:t>
+            </a:r>
+            <a:r>
+              <a:rPr lang="en-US" sz="2800" b="0" strike="noStrike" spc="-1" dirty="0">
+                <a:solidFill>
+                  <a:srgbClr val="000000"/>
+                </a:solidFill>
+                <a:uFill>
+                  <a:solidFill>
+                    <a:srgbClr val="FFFFFF"/>
+                  </a:solidFill>
+                </a:uFill>
+                <a:latin typeface="Calibri"/>
+              </a:rPr>
+              <a:t>Flink connectors use </a:t>
+            </a:r>
+            <a:r>
+              <a:rPr lang="en-US" sz="2800" b="0" strike="noStrike" spc="-1" dirty="0" smtClean="0">
+                <a:solidFill>
+                  <a:srgbClr val="000000"/>
+                </a:solidFill>
+                <a:uFill>
+                  <a:solidFill>
+                    <a:srgbClr val="FFFFFF"/>
+                  </a:solidFill>
+                </a:uFill>
+                <a:latin typeface="Calibri"/>
+              </a:rPr>
+              <a:t>the Transport </a:t>
+            </a:r>
+            <a:r>
+              <a:rPr lang="en-US" sz="2800" b="0" strike="noStrike" spc="-1" dirty="0">
+                <a:solidFill>
+                  <a:srgbClr val="000000"/>
+                </a:solidFill>
+                <a:uFill>
+                  <a:solidFill>
+                    <a:srgbClr val="FFFFFF"/>
+                  </a:solidFill>
+                </a:uFill>
+                <a:latin typeface="Calibri"/>
+              </a:rPr>
+              <a:t>Client to send data</a:t>
             </a:r>
           </a:p>
           <a:p>
@@ -11558,7 +12615,7 @@
               <a:buFont typeface="Wingdings" charset="2"/>
               <a:buChar char=""/>
             </a:pPr>
-            <a:endParaRPr lang="en-US" sz="2800" b="0" strike="noStrike" spc="-1">
+            <a:endParaRPr lang="en-US" sz="2800" b="0" strike="noStrike" spc="-1" dirty="0">
               <a:solidFill>
                 <a:srgbClr val="000000"/>
               </a:solidFill>
@@ -11582,56 +12639,7 @@
               <a:buChar char=""/>
             </a:pPr>
             <a:r>
-              <a:rPr lang="en-US" sz="2800" b="0" strike="noStrike" spc="-1">
-                <a:solidFill>
-                  <a:srgbClr val="000000"/>
-                </a:solidFill>
-                <a:uFill>
-                  <a:solidFill>
-                    <a:srgbClr val="FFFFFF"/>
-                  </a:solidFill>
-                </a:uFill>
-                <a:latin typeface="Calibri"/>
-              </a:rPr>
-              <a:t>The Flink connectors use Transport Client to send data</a:t>
-            </a:r>
-          </a:p>
-          <a:p>
-            <a:pPr marL="343080" indent="-342720">
-              <a:lnSpc>
-                <a:spcPct val="100000"/>
-              </a:lnSpc>
-              <a:buClr>
-                <a:srgbClr val="34AD91"/>
-              </a:buClr>
-              <a:buFont typeface="Wingdings" charset="2"/>
-              <a:buChar char=""/>
-            </a:pPr>
-            <a:endParaRPr lang="en-US" sz="2800" b="0" strike="noStrike" spc="-1">
-              <a:solidFill>
-                <a:srgbClr val="000000"/>
-              </a:solidFill>
-              <a:uFill>
-                <a:solidFill>
-                  <a:srgbClr val="FFFFFF"/>
-                </a:solidFill>
-              </a:uFill>
-              <a:latin typeface="Calibri"/>
-            </a:endParaRPr>
-          </a:p>
-          <a:p>
-            <a:pPr marL="343080" indent="-342720">
-              <a:lnSpc>
-                <a:spcPct val="100000"/>
-              </a:lnSpc>
-              <a:buClr>
-                <a:srgbClr val="34AD91"/>
-              </a:buClr>
-              <a:buFont typeface="Wingdings" charset="2"/>
-              <a:buChar char=""/>
-            </a:pPr>
-            <a:r>
-              <a:rPr lang="en-US" sz="2800" b="0" strike="noStrike" spc="-1">
+              <a:rPr lang="en-US" sz="2800" b="0" strike="noStrike" spc="-1" dirty="0">
                 <a:solidFill>
                   <a:srgbClr val="000000"/>
                 </a:solidFill>
@@ -11655,7 +12663,7 @@
               <a:buChar char="•"/>
             </a:pPr>
             <a:r>
-              <a:rPr lang="en-US" sz="2400" b="0" strike="noStrike" spc="-1">
+              <a:rPr lang="en-US" sz="2400" b="0" strike="noStrike" spc="-1" dirty="0">
                 <a:solidFill>
                   <a:srgbClr val="000000"/>
                 </a:solidFill>
@@ -11668,7 +12676,7 @@
               </a:rPr>
               <a:t>cluster’s network address</a:t>
             </a:r>
-            <a:endParaRPr lang="en-US" b="0" strike="noStrike" spc="-1">
+            <a:endParaRPr lang="en-US" b="0" strike="noStrike" spc="-1" dirty="0">
               <a:solidFill>
                 <a:srgbClr val="000000"/>
               </a:solidFill>
@@ -11690,7 +12698,7 @@
               <a:buChar char="•"/>
             </a:pPr>
             <a:r>
-              <a:rPr lang="en-US" sz="2400" b="0" strike="noStrike" spc="-1">
+              <a:rPr lang="en-US" sz="2400" b="0" strike="noStrike" spc="-1" dirty="0">
                 <a:solidFill>
                   <a:srgbClr val="000000"/>
                 </a:solidFill>
@@ -11703,7 +12711,7 @@
               </a:rPr>
               <a:t>cluster name</a:t>
             </a:r>
-            <a:endParaRPr lang="en-US" b="0" strike="noStrike" spc="-1">
+            <a:endParaRPr lang="en-US" b="0" strike="noStrike" spc="-1" dirty="0">
               <a:solidFill>
                 <a:srgbClr val="000000"/>
               </a:solidFill>
@@ -11725,7 +12733,7 @@
               <a:buChar char="•"/>
             </a:pPr>
             <a:r>
-              <a:rPr lang="en-US" sz="2400" b="0" strike="noStrike" spc="-1">
+              <a:rPr lang="en-US" sz="2400" b="0" strike="noStrike" spc="-1" dirty="0">
                 <a:solidFill>
                   <a:srgbClr val="000000"/>
                 </a:solidFill>
@@ -11738,7 +12746,7 @@
               </a:rPr>
               <a:t>index name</a:t>
             </a:r>
-            <a:endParaRPr lang="en-US" b="0" strike="noStrike" spc="-1">
+            <a:endParaRPr lang="en-US" b="0" strike="noStrike" spc="-1" dirty="0">
               <a:solidFill>
                 <a:srgbClr val="000000"/>
               </a:solidFill>
@@ -11756,7 +12764,7 @@
                 <a:spcPct val="100000"/>
               </a:lnSpc>
             </a:pPr>
-            <a:endParaRPr lang="en-US" sz="3200" b="0" strike="noStrike" spc="-1">
+            <a:endParaRPr lang="en-US" sz="3200" b="0" strike="noStrike" spc="-1" dirty="0">
               <a:solidFill>
                 <a:srgbClr val="000000"/>
               </a:solidFill>
@@ -13976,7 +14984,7 @@
               <a:buFont typeface="Wingdings" charset="2"/>
               <a:buChar char=""/>
             </a:pPr>
-            <a:endParaRPr lang="en-US" sz="3200" b="0" strike="noStrike" spc="-1">
+            <a:endParaRPr lang="en-US" sz="3200" b="0" strike="noStrike" spc="-1" dirty="0">
               <a:uFill>
                 <a:solidFill>
                   <a:srgbClr val="FFFFFF"/>
@@ -14052,7 +15060,7 @@
           </a:p>
           <a:p>
             <a:pPr marL="338328" indent="-338328"/>
-            <a:endParaRPr lang="en-US" sz="3200" b="0" strike="noStrike" spc="-1">
+            <a:endParaRPr lang="en-US" sz="3200" b="0" strike="noStrike" spc="-1" dirty="0">
               <a:uFill>
                 <a:solidFill>
                   <a:srgbClr val="FFFFFF"/>
@@ -14323,7 +15331,7 @@
               <a:buChar char=""/>
             </a:pPr>
             <a:r>
-              <a:rPr lang="en-US" sz="2800" b="0" strike="noStrike" spc="-1">
+              <a:rPr lang="en-US" sz="2800" b="0" strike="noStrike" spc="-1" dirty="0">
                 <a:uFill>
                   <a:solidFill>
                     <a:srgbClr val="FFFFFF"/>
@@ -14343,7 +15351,7 @@
               <a:buChar char="•"/>
             </a:pPr>
             <a:r>
-              <a:rPr lang="en-US" sz="2800" spc="-1">
+              <a:rPr lang="en-US" sz="2800" spc="-1" dirty="0">
                 <a:uFill>
                   <a:solidFill>
                     <a:srgbClr val="FFFFFF"/>
@@ -14363,7 +15371,7 @@
               <a:buChar char="•"/>
             </a:pPr>
             <a:r>
-              <a:rPr lang="en-US" sz="2800" b="0" strike="noStrike" spc="-1">
+              <a:rPr lang="en-US" sz="2800" b="0" strike="noStrike" spc="-1" dirty="0">
                 <a:uFill>
                   <a:solidFill>
                     <a:srgbClr val="FFFFFF"/>
@@ -17201,14 +18209,12 @@
           <a:lstStyle/>
           <a:p>
             <a:r>
-              <a:rPr lang="en-US" sz="2000">
-                <a:solidFill>
-                  <a:schemeClr val="accent6">
-                    <a:lumMod val="50000"/>
-                  </a:schemeClr>
-                </a:solidFill>
-              </a:rPr>
-              <a:t>Note: if you modify a file (e.g. by appending to it), its entire contents will be reprocessed! This will break exactly-once semantics. </a:t>
+              <a:rPr lang="en-US" sz="2000" b="1" dirty="0"/>
+              <a:t>Note:</a:t>
+            </a:r>
+            <a:r>
+              <a:rPr lang="en-US" sz="2000" dirty="0"/>
+              <a:t> if you modify a file (e.g. by appending to it), its entire contents will be reprocessed! This will break exactly-once semantics. </a:t>
             </a:r>
           </a:p>
         </p:txBody>
@@ -17355,18 +18361,17 @@
               </a:lnSpc>
             </a:pPr>
             <a:r>
-              <a:rPr lang="en-US" sz="2800" strike="noStrike" spc="-1">
-                <a:solidFill>
-                  <a:srgbClr val="000000"/>
-                </a:solidFill>
-                <a:uFill>
-                  <a:solidFill>
-                    <a:srgbClr val="FFFFFF"/>
-                  </a:solidFill>
-                </a:uFill>
-                <a:latin typeface="Calibri"/>
-              </a:rPr>
-              <a:t>Write as text file using toString()</a:t>
+              <a:rPr lang="en-US" sz="2800" spc="-1" dirty="0">
+                <a:solidFill>
+                  <a:srgbClr val="000000"/>
+                </a:solidFill>
+                <a:uFill>
+                  <a:solidFill>
+                    <a:srgbClr val="FFFFFF"/>
+                  </a:solidFill>
+                </a:uFill>
+              </a:rPr>
+              <a:t>Print to the standard output</a:t>
             </a:r>
           </a:p>
           <a:p>
@@ -17381,7 +18386,7 @@
               <a:buChar char=""/>
             </a:pPr>
             <a:r>
-              <a:rPr lang="en-US" sz="2000" strike="noStrike" spc="-1">
+              <a:rPr lang="en-US" sz="2000" spc="-1" dirty="0" err="1">
                 <a:solidFill>
                   <a:srgbClr val="000000"/>
                 </a:solidFill>
@@ -17392,10 +18397,13 @@
                 </a:uFill>
                 <a:latin typeface="Consolas"/>
               </a:rPr>
-              <a:t>stream.writeAsText(</a:t>
-            </a:r>
-            <a:r>
-              <a:rPr lang="en-US" sz="2000" spc="-1">
+              <a:t>stream.print</a:t>
+            </a:r>
+            <a:r>
+              <a:rPr lang="en-US" sz="2000" spc="-1" dirty="0">
+                <a:solidFill>
+                  <a:srgbClr val="000000"/>
+                </a:solidFill>
                 <a:uFill>
                   <a:solidFill>
                     <a:srgbClr val="FFFFFF"/>
@@ -17403,57 +18411,17 @@
                 </a:uFill>
                 <a:latin typeface="Consolas"/>
               </a:rPr>
-              <a:t>"</a:t>
-            </a:r>
-            <a:r>
-              <a:rPr lang="en-US" sz="2000" strike="noStrike" spc="-1">
-                <a:solidFill>
-                  <a:srgbClr val="000000"/>
-                </a:solidFill>
-                <a:uFill>
-                  <a:solidFill>
-                    <a:srgbClr val="FFFFFF"/>
-                  </a:solidFill>
-                </a:uFill>
-                <a:latin typeface="Consolas"/>
-              </a:rPr>
-              <a:t>/path/to/file</a:t>
-            </a:r>
-            <a:r>
-              <a:rPr lang="en-US" sz="2000" spc="-1">
-                <a:uFill>
-                  <a:solidFill>
-                    <a:srgbClr val="FFFFFF"/>
-                  </a:solidFill>
-                </a:uFill>
-                <a:latin typeface="Consolas"/>
-              </a:rPr>
-              <a:t>"</a:t>
-            </a:r>
-            <a:r>
-              <a:rPr lang="en-US" sz="2000" strike="noStrike" spc="-1">
-                <a:solidFill>
-                  <a:srgbClr val="000000"/>
-                </a:solidFill>
-                <a:uFill>
-                  <a:solidFill>
-                    <a:srgbClr val="FFFFFF"/>
-                  </a:solidFill>
-                </a:uFill>
-                <a:latin typeface="Consolas"/>
-              </a:rPr>
-              <a:t>)</a:t>
-            </a:r>
-            <a:endParaRPr lang="en-US" sz="2000" strike="noStrike" spc="-1">
-              <a:solidFill>
-                <a:srgbClr val="000000"/>
-              </a:solidFill>
-              <a:uFill>
-                <a:solidFill>
-                  <a:srgbClr val="FFFFFF"/>
-                </a:solidFill>
-              </a:uFill>
-              <a:latin typeface="Calibri"/>
+              <a:t>()</a:t>
+            </a:r>
+            <a:endParaRPr lang="en-US" sz="2000" spc="-1" dirty="0">
+              <a:solidFill>
+                <a:srgbClr val="000000"/>
+              </a:solidFill>
+              <a:uFill>
+                <a:solidFill>
+                  <a:srgbClr val="FFFFFF"/>
+                </a:solidFill>
+              </a:uFill>
             </a:endParaRPr>
           </a:p>
           <a:p>
@@ -17462,7 +18430,7 @@
                 <a:spcPct val="100000"/>
               </a:lnSpc>
             </a:pPr>
-            <a:endParaRPr lang="en-US" sz="2000" strike="noStrike" spc="-1">
+            <a:endParaRPr lang="en-US" sz="2800" strike="noStrike" spc="-1" dirty="0" smtClean="0">
               <a:solidFill>
                 <a:srgbClr val="000000"/>
               </a:solidFill>
@@ -17481,18 +18449,60 @@
               </a:lnSpc>
             </a:pPr>
             <a:r>
-              <a:rPr lang="en-US" sz="2800" strike="noStrike" spc="-1">
-                <a:solidFill>
-                  <a:srgbClr val="000000"/>
-                </a:solidFill>
-                <a:uFill>
-                  <a:solidFill>
-                    <a:srgbClr val="FFFFFF"/>
-                  </a:solidFill>
-                </a:uFill>
-                <a:latin typeface="Calibri"/>
-              </a:rPr>
-              <a:t>Write as CSV file</a:t>
+              <a:rPr lang="en-US" sz="2800" strike="noStrike" spc="-1" dirty="0" smtClean="0">
+                <a:solidFill>
+                  <a:srgbClr val="000000"/>
+                </a:solidFill>
+                <a:uFill>
+                  <a:solidFill>
+                    <a:srgbClr val="FFFFFF"/>
+                  </a:solidFill>
+                </a:uFill>
+                <a:latin typeface="Calibri"/>
+              </a:rPr>
+              <a:t>Write </a:t>
+            </a:r>
+            <a:r>
+              <a:rPr lang="en-US" sz="2800" strike="noStrike" spc="-1" dirty="0">
+                <a:solidFill>
+                  <a:srgbClr val="000000"/>
+                </a:solidFill>
+                <a:uFill>
+                  <a:solidFill>
+                    <a:srgbClr val="FFFFFF"/>
+                  </a:solidFill>
+                </a:uFill>
+                <a:latin typeface="Calibri"/>
+              </a:rPr>
+              <a:t>as text file using </a:t>
+            </a:r>
+            <a:r>
+              <a:rPr lang="en-US" sz="2800" strike="noStrike" spc="-1" dirty="0" err="1">
+                <a:solidFill>
+                  <a:srgbClr val="000000"/>
+                </a:solidFill>
+                <a:uFill>
+                  <a:solidFill>
+                    <a:srgbClr val="FFFFFF"/>
+                  </a:solidFill>
+                </a:uFill>
+                <a:latin typeface="Calibri"/>
+              </a:rPr>
+              <a:t>toString</a:t>
+            </a:r>
+            <a:r>
+              <a:rPr lang="en-US" sz="2800" strike="noStrike" spc="-1" dirty="0">
+                <a:solidFill>
+                  <a:srgbClr val="000000"/>
+                </a:solidFill>
+                <a:uFill>
+                  <a:solidFill>
+                    <a:srgbClr val="FFFFFF"/>
+                  </a:solidFill>
+                </a:uFill>
+                <a:latin typeface="Calibri"/>
+              </a:rPr>
+              <a:t>()</a:t>
             </a:r>
           </a:p>
           <a:p>
@@ -17507,7 +18517,7 @@
               <a:buChar char=""/>
             </a:pPr>
             <a:r>
-              <a:rPr lang="en-US" sz="2000" strike="noStrike" spc="-1">
+              <a:rPr lang="en-US" sz="2000" strike="noStrike" spc="-1" dirty="0" err="1">
                 <a:solidFill>
                   <a:srgbClr val="000000"/>
                 </a:solidFill>
@@ -17518,10 +18528,13 @@
                 </a:uFill>
                 <a:latin typeface="Consolas"/>
               </a:rPr>
-              <a:t>stream.writeAsCsv(</a:t>
-            </a:r>
-            <a:r>
-              <a:rPr lang="en-US" sz="2000" spc="-1">
+              <a:t>stream.writeAsText</a:t>
+            </a:r>
+            <a:r>
+              <a:rPr lang="en-US" sz="2000" strike="noStrike" spc="-1" dirty="0">
+                <a:solidFill>
+                  <a:srgbClr val="000000"/>
+                </a:solidFill>
                 <a:uFill>
                   <a:solidFill>
                     <a:srgbClr val="FFFFFF"/>
@@ -17529,10 +18542,21 @@
                 </a:uFill>
                 <a:latin typeface="Consolas"/>
               </a:rPr>
+              <a:t>(</a:t>
+            </a:r>
+            <a:r>
+              <a:rPr lang="en-US" sz="2000" spc="-1" dirty="0">
+                <a:uFill>
+                  <a:solidFill>
+                    <a:srgbClr val="FFFFFF"/>
+                  </a:solidFill>
+                </a:uFill>
+                <a:latin typeface="Consolas"/>
+              </a:rPr>
               <a:t>"</a:t>
             </a:r>
             <a:r>
-              <a:rPr lang="en-US" sz="2000" strike="noStrike" spc="-1">
+              <a:rPr lang="en-US" sz="2000" strike="noStrike" spc="-1" dirty="0">
                 <a:solidFill>
                   <a:srgbClr val="000000"/>
                 </a:solidFill>
@@ -17546,7 +18570,7 @@
               <a:t>/path/to/file</a:t>
             </a:r>
             <a:r>
-              <a:rPr lang="en-US" sz="2000" spc="-1">
+              <a:rPr lang="en-US" sz="2000" spc="-1" dirty="0">
                 <a:uFill>
                   <a:solidFill>
                     <a:srgbClr val="FFFFFF"/>
@@ -17557,7 +18581,7 @@
               <a:t>"</a:t>
             </a:r>
             <a:r>
-              <a:rPr lang="en-US" sz="2000" strike="noStrike" spc="-1">
+              <a:rPr lang="en-US" sz="2000" strike="noStrike" spc="-1" dirty="0">
                 <a:solidFill>
                   <a:srgbClr val="000000"/>
                 </a:solidFill>
@@ -17570,7 +18594,7 @@
               </a:rPr>
               <a:t>)</a:t>
             </a:r>
-            <a:endParaRPr lang="en-US" sz="2000" strike="noStrike" spc="-1">
+            <a:endParaRPr lang="en-US" sz="2000" strike="noStrike" spc="-1" dirty="0">
               <a:solidFill>
                 <a:srgbClr val="000000"/>
               </a:solidFill>
@@ -17588,7 +18612,7 @@
                 <a:spcPct val="100000"/>
               </a:lnSpc>
             </a:pPr>
-            <a:endParaRPr lang="en-US" sz="2400" strike="noStrike" spc="-1">
+            <a:endParaRPr lang="en-US" sz="2000" strike="noStrike" spc="-1" dirty="0">
               <a:solidFill>
                 <a:srgbClr val="000000"/>
               </a:solidFill>
@@ -17607,18 +18631,18 @@
               </a:lnSpc>
             </a:pPr>
             <a:r>
-              <a:rPr lang="en-US" sz="2800" strike="noStrike" spc="-1">
-                <a:solidFill>
-                  <a:srgbClr val="000000"/>
-                </a:solidFill>
-                <a:uFill>
-                  <a:solidFill>
-                    <a:srgbClr val="FFFFFF"/>
-                  </a:solidFill>
-                </a:uFill>
-                <a:latin typeface="Calibri"/>
-              </a:rPr>
-              <a:t>Print to the standard output</a:t>
+              <a:rPr lang="en-US" sz="2800" strike="noStrike" spc="-1" dirty="0">
+                <a:solidFill>
+                  <a:srgbClr val="000000"/>
+                </a:solidFill>
+                <a:uFill>
+                  <a:solidFill>
+                    <a:srgbClr val="FFFFFF"/>
+                  </a:solidFill>
+                </a:uFill>
+                <a:latin typeface="Calibri"/>
+              </a:rPr>
+              <a:t>Write as CSV file</a:t>
             </a:r>
           </a:p>
           <a:p>
@@ -17633,7 +18657,7 @@
               <a:buChar char=""/>
             </a:pPr>
             <a:r>
-              <a:rPr lang="en-US" sz="2000" strike="noStrike" spc="-1">
+              <a:rPr lang="en-US" sz="2000" strike="noStrike" spc="-1" dirty="0" err="1">
                 <a:solidFill>
                   <a:srgbClr val="000000"/>
                 </a:solidFill>
@@ -17644,9 +18668,73 @@
                 </a:uFill>
                 <a:latin typeface="Consolas"/>
               </a:rPr>
-              <a:t>stream.print()</a:t>
-            </a:r>
-            <a:endParaRPr lang="en-US" sz="2000" strike="noStrike" spc="-1">
+              <a:t>stream.writeAsCsv</a:t>
+            </a:r>
+            <a:r>
+              <a:rPr lang="en-US" sz="2000" strike="noStrike" spc="-1" dirty="0">
+                <a:solidFill>
+                  <a:srgbClr val="000000"/>
+                </a:solidFill>
+                <a:uFill>
+                  <a:solidFill>
+                    <a:srgbClr val="FFFFFF"/>
+                  </a:solidFill>
+                </a:uFill>
+                <a:latin typeface="Consolas"/>
+              </a:rPr>
+              <a:t>(</a:t>
+            </a:r>
+            <a:r>
+              <a:rPr lang="en-US" sz="2000" spc="-1" dirty="0">
+                <a:uFill>
+                  <a:solidFill>
+                    <a:srgbClr val="FFFFFF"/>
+                  </a:solidFill>
+                </a:uFill>
+                <a:latin typeface="Consolas"/>
+              </a:rPr>
+              <a:t>"</a:t>
+            </a:r>
+            <a:r>
+              <a:rPr lang="en-US" sz="2000" strike="noStrike" spc="-1" dirty="0">
+                <a:solidFill>
+                  <a:srgbClr val="000000"/>
+                </a:solidFill>
+                <a:uFill>
+                  <a:solidFill>
+                    <a:srgbClr val="FFFFFF"/>
+                  </a:solidFill>
+                </a:uFill>
+                <a:latin typeface="Consolas"/>
+              </a:rPr>
+              <a:t>/path/to/file</a:t>
+            </a:r>
+            <a:r>
+              <a:rPr lang="en-US" sz="2000" spc="-1" dirty="0">
+                <a:uFill>
+                  <a:solidFill>
+                    <a:srgbClr val="FFFFFF"/>
+                  </a:solidFill>
+                </a:uFill>
+                <a:latin typeface="Consolas"/>
+              </a:rPr>
+              <a:t>"</a:t>
+            </a:r>
+            <a:r>
+              <a:rPr lang="en-US" sz="2000" strike="noStrike" spc="-1" dirty="0">
+                <a:solidFill>
+                  <a:srgbClr val="000000"/>
+                </a:solidFill>
+                <a:uFill>
+                  <a:solidFill>
+                    <a:srgbClr val="FFFFFF"/>
+                  </a:solidFill>
+                </a:uFill>
+                <a:latin typeface="Consolas"/>
+              </a:rPr>
+              <a:t>)</a:t>
+            </a:r>
+            <a:endParaRPr lang="en-US" sz="2000" strike="noStrike" spc="-1" dirty="0">
               <a:solidFill>
                 <a:srgbClr val="000000"/>
               </a:solidFill>
@@ -17664,7 +18752,7 @@
                 <a:spcPct val="100000"/>
               </a:lnSpc>
             </a:pPr>
-            <a:endParaRPr lang="en-US" sz="2400" strike="noStrike" spc="-1">
+            <a:endParaRPr lang="en-US" sz="2400" strike="noStrike" spc="-1" dirty="0">
               <a:solidFill>
                 <a:srgbClr val="000000"/>
               </a:solidFill>
@@ -17683,18 +18771,32 @@
               </a:lnSpc>
             </a:pPr>
             <a:r>
-              <a:rPr lang="en-US" sz="2800" strike="noStrike" spc="-1">
-                <a:solidFill>
-                  <a:srgbClr val="000000"/>
-                </a:solidFill>
-                <a:uFill>
-                  <a:solidFill>
-                    <a:srgbClr val="FFFFFF"/>
-                  </a:solidFill>
-                </a:uFill>
-                <a:latin typeface="Calibri"/>
-              </a:rPr>
-              <a:t>Emit to socket</a:t>
+              <a:rPr lang="en-US" sz="2800" strike="noStrike" spc="-1" dirty="0" smtClean="0">
+                <a:solidFill>
+                  <a:srgbClr val="000000"/>
+                </a:solidFill>
+                <a:uFill>
+                  <a:solidFill>
+                    <a:srgbClr val="FFFFFF"/>
+                  </a:solidFill>
+                </a:uFill>
+                <a:latin typeface="Calibri"/>
+              </a:rPr>
+              <a:t>Emit </a:t>
+            </a:r>
+            <a:r>
+              <a:rPr lang="en-US" sz="2800" strike="noStrike" spc="-1" dirty="0">
+                <a:solidFill>
+                  <a:srgbClr val="000000"/>
+                </a:solidFill>
+                <a:uFill>
+                  <a:solidFill>
+                    <a:srgbClr val="FFFFFF"/>
+                  </a:solidFill>
+                </a:uFill>
+                <a:latin typeface="Calibri"/>
+              </a:rPr>
+              <a:t>to socket</a:t>
             </a:r>
           </a:p>
           <a:p>
@@ -17709,7 +18811,7 @@
               <a:buChar char=""/>
             </a:pPr>
             <a:r>
-              <a:rPr lang="en-US" sz="2000" strike="noStrike" spc="-1">
+              <a:rPr lang="en-US" sz="2000" strike="noStrike" spc="-1" dirty="0" err="1">
                 <a:solidFill>
                   <a:srgbClr val="000000"/>
                 </a:solidFill>
@@ -17720,9 +18822,51 @@
                 </a:uFill>
                 <a:latin typeface="Consolas"/>
               </a:rPr>
-              <a:t>stream.writeToSocket(host, port, SerializationSchema)</a:t>
-            </a:r>
-            <a:endParaRPr lang="en-US" sz="2000" strike="noStrike" spc="-1">
+              <a:t>stream.writeToSocket</a:t>
+            </a:r>
+            <a:r>
+              <a:rPr lang="en-US" sz="2000" strike="noStrike" spc="-1" dirty="0">
+                <a:solidFill>
+                  <a:srgbClr val="000000"/>
+                </a:solidFill>
+                <a:uFill>
+                  <a:solidFill>
+                    <a:srgbClr val="FFFFFF"/>
+                  </a:solidFill>
+                </a:uFill>
+                <a:latin typeface="Consolas"/>
+              </a:rPr>
+              <a:t>(host, port, </a:t>
+            </a:r>
+            <a:r>
+              <a:rPr lang="en-US" sz="2000" strike="noStrike" spc="-1" dirty="0" err="1">
+                <a:solidFill>
+                  <a:srgbClr val="000000"/>
+                </a:solidFill>
+                <a:uFill>
+                  <a:solidFill>
+                    <a:srgbClr val="FFFFFF"/>
+                  </a:solidFill>
+                </a:uFill>
+                <a:latin typeface="Consolas"/>
+              </a:rPr>
+              <a:t>SerializationSchema</a:t>
+            </a:r>
+            <a:r>
+              <a:rPr lang="en-US" sz="2000" strike="noStrike" spc="-1" dirty="0">
+                <a:solidFill>
+                  <a:srgbClr val="000000"/>
+                </a:solidFill>
+                <a:uFill>
+                  <a:solidFill>
+                    <a:srgbClr val="FFFFFF"/>
+                  </a:solidFill>
+                </a:uFill>
+                <a:latin typeface="Consolas"/>
+              </a:rPr>
+              <a:t>)</a:t>
+            </a:r>
+            <a:endParaRPr lang="en-US" sz="2000" strike="noStrike" spc="-1" dirty="0">
               <a:solidFill>
                 <a:srgbClr val="000000"/>
               </a:solidFill>
@@ -17740,7 +18884,7 @@
                 <a:spcPct val="100000"/>
               </a:lnSpc>
             </a:pPr>
-            <a:endParaRPr lang="en-US" sz="3200" strike="noStrike" spc="-1">
+            <a:endParaRPr lang="en-US" sz="3200" strike="noStrike" spc="-1" dirty="0">
               <a:solidFill>
                 <a:srgbClr val="000000"/>
               </a:solidFill>
@@ -17758,7 +18902,7 @@
                 <a:spcPct val="100000"/>
               </a:lnSpc>
             </a:pPr>
-            <a:endParaRPr lang="en-US" sz="3200" strike="noStrike" spc="-1">
+            <a:endParaRPr lang="en-US" sz="3200" strike="noStrike" spc="-1" dirty="0">
               <a:solidFill>
                 <a:srgbClr val="000000"/>
               </a:solidFill>
@@ -19505,7 +20649,7 @@
   <a:extraClrSchemeLst/>
   <a:extLst>
     <a:ext uri="{05A4C25C-085E-4340-85A3-A5531E510DB2}">
-      <thm15:themeFamily xmlns="" xmlns:thm15="http://schemas.microsoft.com/office/thememl/2012/main" name="Office Theme" id="{62F939B6-93AF-4DB8-9C6B-D6C7DFDC589F}" vid="{4A3C46E8-61CC-4603-A589-7422A47A8E4A}"/>
+      <thm15:themeFamily xmlns:thm15="http://schemas.microsoft.com/office/thememl/2012/main" xmlns="" name="Office Theme" id="{62F939B6-93AF-4DB8-9C6B-D6C7DFDC589F}" vid="{4A3C46E8-61CC-4603-A589-7422A47A8E4A}"/>
     </a:ext>
   </a:extLst>
 </a:theme>

</xml_diff>

<commit_message>
More updates to the slides. Major overhaul for the intro; minor updates otherwise.
</commit_message>
<xml_diff>
--- a/slides/flink_stream_connectors.pptx
+++ b/slides/flink_stream_connectors.pptx
@@ -34795,7 +34795,26 @@
                 <a:sym typeface="Calibri"/>
                 <a:hlinkClick r:id="rId3"/>
               </a:rPr>
-              <a:t>ci.apache.org/projects/flink/flink-docs-release-1.2/dev/connectors/kafka.html#using-kafka-timestamps-and-flink-event-time-in-kafka-010</a:t>
+              <a:t>ci.apache.org/projects/flink</a:t>
+            </a:r>
+            <a:r>
+              <a:rPr lang="en-US" sz="2800" smtClean="0">
+                <a:latin typeface="Calibri" charset="0"/>
+                <a:ea typeface="Calibri" charset="0"/>
+                <a:cs typeface="Calibri" charset="0"/>
+                <a:sym typeface="Calibri"/>
+                <a:hlinkClick r:id="rId3"/>
+              </a:rPr>
+              <a:t>/flink-docs-release-1.3/dev/connectors/kafka.html#using-kafka-timestamps-and-flink-event-time-in-kafka-010</a:t>
+            </a:r>
+            <a:r>
+              <a:rPr lang="en-US" sz="2800" smtClean="0">
+                <a:latin typeface="Calibri" charset="0"/>
+                <a:ea typeface="Calibri" charset="0"/>
+                <a:cs typeface="Calibri" charset="0"/>
+                <a:sym typeface="Calibri"/>
+              </a:rPr>
+              <a:t> </a:t>
             </a:r>
             <a:r>
               <a:rPr lang="en-US" sz="2800" dirty="0" smtClean="0">
@@ -34804,7 +34823,7 @@
                 <a:cs typeface="Calibri" charset="0"/>
                 <a:sym typeface="Calibri"/>
               </a:rPr>
-              <a:t> for details</a:t>
+              <a:t>for details</a:t>
             </a:r>
           </a:p>
           <a:p>
@@ -35008,6 +35027,18 @@
                 <a:sym typeface="Calibri"/>
               </a:rPr>
               <a:t>Tolerance</a:t>
+            </a:r>
+            <a:r>
+              <a:rPr lang="en-US" sz="4000" b="1" i="0" u="none" strike="noStrike" cap="none" dirty="0" smtClean="0">
+                <a:solidFill>
+                  <a:srgbClr val="FFFFFF"/>
+                </a:solidFill>
+                <a:latin typeface="Calibri"/>
+                <a:ea typeface="Calibri"/>
+                <a:cs typeface="Calibri"/>
+                <a:sym typeface="Calibri"/>
+              </a:rPr>
+              <a:t> Guarantees</a:t>
             </a:r>
             <a:endParaRPr lang="en" sz="4000" b="1" i="0" u="none" strike="noStrike" cap="none" dirty="0">
               <a:solidFill>
@@ -35760,7 +35791,7 @@
               <a:buNone/>
             </a:pPr>
             <a:r>
-              <a:rPr lang="en" sz="4400" b="0" i="0" u="none" strike="noStrike" cap="none">
+              <a:rPr lang="en" sz="4400" b="0" i="0" u="none" strike="noStrike" cap="none" dirty="0">
                 <a:solidFill>
                   <a:schemeClr val="dk1"/>
                 </a:solidFill>
@@ -35769,8 +35800,41 @@
                 <a:cs typeface="Calibri"/>
                 <a:sym typeface="Calibri"/>
               </a:rPr>
-              <a:t>Fault Tolerance</a:t>
+              <a:t>Fault </a:t>
             </a:r>
+            <a:r>
+              <a:rPr lang="en" sz="4400" b="0" i="0" u="none" strike="noStrike" cap="none" dirty="0" smtClean="0">
+                <a:solidFill>
+                  <a:schemeClr val="dk1"/>
+                </a:solidFill>
+                <a:latin typeface="Calibri"/>
+                <a:ea typeface="Calibri"/>
+                <a:cs typeface="Calibri"/>
+                <a:sym typeface="Calibri"/>
+              </a:rPr>
+              <a:t>Tolerance</a:t>
+            </a:r>
+            <a:r>
+              <a:rPr lang="en-US" sz="4400" b="0" i="0" u="none" strike="noStrike" cap="none" smtClean="0">
+                <a:solidFill>
+                  <a:schemeClr val="dk1"/>
+                </a:solidFill>
+                <a:latin typeface="Calibri"/>
+                <a:ea typeface="Calibri"/>
+                <a:cs typeface="Calibri"/>
+                <a:sym typeface="Calibri"/>
+              </a:rPr>
+              <a:t> Guarantees</a:t>
+            </a:r>
+            <a:endParaRPr lang="en" sz="4400" b="0" i="0" u="none" strike="noStrike" cap="none">
+              <a:solidFill>
+                <a:schemeClr val="dk1"/>
+              </a:solidFill>
+              <a:latin typeface="Calibri"/>
+              <a:ea typeface="Calibri"/>
+              <a:cs typeface="Calibri"/>
+              <a:sym typeface="Calibri"/>
+            </a:endParaRPr>
           </a:p>
         </p:txBody>
       </p:sp>

</xml_diff>